<commit_message>
Fix PNA labelling in KF analysis
</commit_message>
<xml_diff>
--- a/images/Analysis/c7plus-characterisation/c7plus-characterisation-images.pptx
+++ b/images/Analysis/c7plus-characterisation/c7plus-characterisation-images.pptx
@@ -1412,9 +1412,9 @@
           <c:layoutTarget val="inner"/>
           <c:xMode val="edge"/>
           <c:yMode val="edge"/>
-          <c:x val="0.1002368226975982"/>
+          <c:x val="0.11640151146855747"/>
           <c:y val="0.13737037037037036"/>
-          <c:w val="0.71306683446475028"/>
+          <c:w val="0.70935568759562673"/>
           <c:h val="0.69846923301254005"/>
         </c:manualLayout>
       </c:layout>
@@ -1422,10 +1422,335 @@
         <c:scatterStyle val="lineMarker"/>
         <c:varyColors val="0"/>
         <c:ser>
-          <c:idx val="0"/>
+          <c:idx val="1"/>
           <c:order val="0"/>
           <c:tx>
             <c:v>Paraffins</c:v>
+          </c:tx>
+          <c:spPr>
+            <a:ln w="31750" cap="rnd">
+              <a:solidFill>
+                <a:srgbClr val="C00000"/>
+              </a:solidFill>
+              <a:round/>
+            </a:ln>
+            <a:effectLst/>
+          </c:spPr>
+          <c:marker>
+            <c:symbol val="circle"/>
+            <c:size val="5"/>
+            <c:spPr>
+              <a:solidFill>
+                <a:srgbClr val="FF9999"/>
+              </a:solidFill>
+              <a:ln w="12700">
+                <a:solidFill>
+                  <a:srgbClr val="C00000"/>
+                </a:solidFill>
+              </a:ln>
+              <a:effectLst/>
+            </c:spPr>
+          </c:marker>
+          <c:xVal>
+            <c:numRef>
+              <c:f>Sheet1!$I$32:$I$76</c:f>
+              <c:numCache>
+                <c:formatCode>General</c:formatCode>
+                <c:ptCount val="45"/>
+                <c:pt idx="0">
+                  <c:v>6</c:v>
+                </c:pt>
+                <c:pt idx="1">
+                  <c:v>7</c:v>
+                </c:pt>
+                <c:pt idx="2">
+                  <c:v>8</c:v>
+                </c:pt>
+                <c:pt idx="3">
+                  <c:v>9</c:v>
+                </c:pt>
+                <c:pt idx="4">
+                  <c:v>10</c:v>
+                </c:pt>
+                <c:pt idx="5">
+                  <c:v>11</c:v>
+                </c:pt>
+                <c:pt idx="6">
+                  <c:v>12</c:v>
+                </c:pt>
+                <c:pt idx="7">
+                  <c:v>13</c:v>
+                </c:pt>
+                <c:pt idx="8">
+                  <c:v>14</c:v>
+                </c:pt>
+                <c:pt idx="9">
+                  <c:v>15</c:v>
+                </c:pt>
+                <c:pt idx="10">
+                  <c:v>16</c:v>
+                </c:pt>
+                <c:pt idx="11">
+                  <c:v>17</c:v>
+                </c:pt>
+                <c:pt idx="12">
+                  <c:v>18</c:v>
+                </c:pt>
+                <c:pt idx="13">
+                  <c:v>19</c:v>
+                </c:pt>
+                <c:pt idx="14">
+                  <c:v>20</c:v>
+                </c:pt>
+                <c:pt idx="15">
+                  <c:v>21</c:v>
+                </c:pt>
+                <c:pt idx="16">
+                  <c:v>22</c:v>
+                </c:pt>
+                <c:pt idx="17">
+                  <c:v>23</c:v>
+                </c:pt>
+                <c:pt idx="18">
+                  <c:v>24</c:v>
+                </c:pt>
+                <c:pt idx="19">
+                  <c:v>25</c:v>
+                </c:pt>
+                <c:pt idx="20">
+                  <c:v>26</c:v>
+                </c:pt>
+                <c:pt idx="21">
+                  <c:v>27</c:v>
+                </c:pt>
+                <c:pt idx="22">
+                  <c:v>28</c:v>
+                </c:pt>
+                <c:pt idx="23">
+                  <c:v>29</c:v>
+                </c:pt>
+                <c:pt idx="24">
+                  <c:v>30</c:v>
+                </c:pt>
+                <c:pt idx="25">
+                  <c:v>31</c:v>
+                </c:pt>
+                <c:pt idx="26">
+                  <c:v>32</c:v>
+                </c:pt>
+                <c:pt idx="27">
+                  <c:v>33</c:v>
+                </c:pt>
+                <c:pt idx="28">
+                  <c:v>34</c:v>
+                </c:pt>
+                <c:pt idx="29">
+                  <c:v>35</c:v>
+                </c:pt>
+                <c:pt idx="30">
+                  <c:v>36</c:v>
+                </c:pt>
+                <c:pt idx="31">
+                  <c:v>37</c:v>
+                </c:pt>
+                <c:pt idx="32">
+                  <c:v>38</c:v>
+                </c:pt>
+                <c:pt idx="33">
+                  <c:v>39</c:v>
+                </c:pt>
+                <c:pt idx="34">
+                  <c:v>40</c:v>
+                </c:pt>
+                <c:pt idx="35">
+                  <c:v>41</c:v>
+                </c:pt>
+                <c:pt idx="36">
+                  <c:v>42</c:v>
+                </c:pt>
+                <c:pt idx="37">
+                  <c:v>43</c:v>
+                </c:pt>
+                <c:pt idx="38">
+                  <c:v>44</c:v>
+                </c:pt>
+                <c:pt idx="39">
+                  <c:v>45</c:v>
+                </c:pt>
+                <c:pt idx="40">
+                  <c:v>46</c:v>
+                </c:pt>
+                <c:pt idx="41">
+                  <c:v>47</c:v>
+                </c:pt>
+                <c:pt idx="42">
+                  <c:v>48</c:v>
+                </c:pt>
+                <c:pt idx="43">
+                  <c:v>49</c:v>
+                </c:pt>
+                <c:pt idx="44">
+                  <c:v>50</c:v>
+                </c:pt>
+              </c:numCache>
+            </c:numRef>
+          </c:xVal>
+          <c:yVal>
+            <c:numRef>
+              <c:f>Sheet1!$O$32:$O$76</c:f>
+              <c:numCache>
+                <c:formatCode>0.0%</c:formatCode>
+                <c:ptCount val="45"/>
+                <c:pt idx="0">
+                  <c:v>0.80900000000000005</c:v>
+                </c:pt>
+                <c:pt idx="1">
+                  <c:v>0.67100000000000004</c:v>
+                </c:pt>
+                <c:pt idx="2">
+                  <c:v>0.58799999999999997</c:v>
+                </c:pt>
+                <c:pt idx="3">
+                  <c:v>0.51800000000000002</c:v>
+                </c:pt>
+                <c:pt idx="4">
+                  <c:v>0.46700000000000003</c:v>
+                </c:pt>
+                <c:pt idx="5">
+                  <c:v>0.42799999999999999</c:v>
+                </c:pt>
+                <c:pt idx="6">
+                  <c:v>0.39100000000000001</c:v>
+                </c:pt>
+                <c:pt idx="7">
+                  <c:v>0.35699999999999998</c:v>
+                </c:pt>
+                <c:pt idx="8">
+                  <c:v>0.32400000000000001</c:v>
+                </c:pt>
+                <c:pt idx="9">
+                  <c:v>0.69799999999999995</c:v>
+                </c:pt>
+                <c:pt idx="10">
+                  <c:v>0.69499999999999995</c:v>
+                </c:pt>
+                <c:pt idx="11">
+                  <c:v>0.68899999999999995</c:v>
+                </c:pt>
+                <c:pt idx="12">
+                  <c:v>0.68799999999999994</c:v>
+                </c:pt>
+                <c:pt idx="13">
+                  <c:v>0.68600000000000005</c:v>
+                </c:pt>
+                <c:pt idx="14">
+                  <c:v>0.68500000000000005</c:v>
+                </c:pt>
+                <c:pt idx="15">
+                  <c:v>0.68400000000000005</c:v>
+                </c:pt>
+                <c:pt idx="16">
+                  <c:v>0.64800000000000002</c:v>
+                </c:pt>
+                <c:pt idx="17">
+                  <c:v>0.63800000000000001</c:v>
+                </c:pt>
+                <c:pt idx="18">
+                  <c:v>0.63200000000000001</c:v>
+                </c:pt>
+                <c:pt idx="19">
+                  <c:v>0.628</c:v>
+                </c:pt>
+                <c:pt idx="20">
+                  <c:v>0.621</c:v>
+                </c:pt>
+                <c:pt idx="21">
+                  <c:v>0.61399999999999999</c:v>
+                </c:pt>
+                <c:pt idx="22">
+                  <c:v>0.61099999999999999</c:v>
+                </c:pt>
+                <c:pt idx="23">
+                  <c:v>0.60699999999999998</c:v>
+                </c:pt>
+                <c:pt idx="24">
+                  <c:v>0.60399999999999998</c:v>
+                </c:pt>
+                <c:pt idx="25">
+                  <c:v>0.59699999999999998</c:v>
+                </c:pt>
+                <c:pt idx="26">
+                  <c:v>0.59299999999999997</c:v>
+                </c:pt>
+                <c:pt idx="27">
+                  <c:v>0.59</c:v>
+                </c:pt>
+                <c:pt idx="28">
+                  <c:v>0.58899999999999997</c:v>
+                </c:pt>
+                <c:pt idx="29">
+                  <c:v>0.58599999999999997</c:v>
+                </c:pt>
+                <c:pt idx="30">
+                  <c:v>0.58599999999999997</c:v>
+                </c:pt>
+                <c:pt idx="31">
+                  <c:v>0.58199999999999996</c:v>
+                </c:pt>
+                <c:pt idx="32">
+                  <c:v>0.58199999999999996</c:v>
+                </c:pt>
+                <c:pt idx="33">
+                  <c:v>0.58299999999999996</c:v>
+                </c:pt>
+                <c:pt idx="34">
+                  <c:v>0.58199999999999996</c:v>
+                </c:pt>
+                <c:pt idx="35">
+                  <c:v>0.58299999999999996</c:v>
+                </c:pt>
+                <c:pt idx="36">
+                  <c:v>0.58599999999999997</c:v>
+                </c:pt>
+                <c:pt idx="37">
+                  <c:v>0.58599999999999997</c:v>
+                </c:pt>
+                <c:pt idx="38">
+                  <c:v>0.58699999999999997</c:v>
+                </c:pt>
+                <c:pt idx="39">
+                  <c:v>0.58730000000000004</c:v>
+                </c:pt>
+                <c:pt idx="40">
+                  <c:v>0.58730000000000004</c:v>
+                </c:pt>
+                <c:pt idx="41">
+                  <c:v>0.58730000000000004</c:v>
+                </c:pt>
+                <c:pt idx="42">
+                  <c:v>0.58730000000000004</c:v>
+                </c:pt>
+                <c:pt idx="43">
+                  <c:v>0.58730000000000004</c:v>
+                </c:pt>
+                <c:pt idx="44">
+                  <c:v>0.58730000000000004</c:v>
+                </c:pt>
+              </c:numCache>
+            </c:numRef>
+          </c:yVal>
+          <c:smooth val="0"/>
+          <c:extLst>
+            <c:ext xmlns:c16="http://schemas.microsoft.com/office/drawing/2014/chart" uri="{C3380CC4-5D6E-409C-BE32-E72D297353CC}">
+              <c16:uniqueId val="{00000000-2C3D-46AE-A52E-E214531E5C0E}"/>
+            </c:ext>
+          </c:extLst>
+        </c:ser>
+        <c:ser>
+          <c:idx val="0"/>
+          <c:order val="1"/>
+          <c:tx>
+            <c:v>Naphthenes</c:v>
           </c:tx>
           <c:spPr>
             <a:ln w="31750" cap="rnd">
@@ -1742,332 +2067,7 @@
           <c:smooth val="0"/>
           <c:extLst>
             <c:ext xmlns:c16="http://schemas.microsoft.com/office/drawing/2014/chart" uri="{C3380CC4-5D6E-409C-BE32-E72D297353CC}">
-              <c16:uniqueId val="{00000000-11EB-4395-A546-036DE7D930CB}"/>
-            </c:ext>
-          </c:extLst>
-        </c:ser>
-        <c:ser>
-          <c:idx val="1"/>
-          <c:order val="1"/>
-          <c:tx>
-            <c:v>Naphthenes</c:v>
-          </c:tx>
-          <c:spPr>
-            <a:ln w="31750" cap="rnd">
-              <a:solidFill>
-                <a:srgbClr val="C00000"/>
-              </a:solidFill>
-              <a:round/>
-            </a:ln>
-            <a:effectLst/>
-          </c:spPr>
-          <c:marker>
-            <c:symbol val="circle"/>
-            <c:size val="5"/>
-            <c:spPr>
-              <a:solidFill>
-                <a:srgbClr val="FF9999"/>
-              </a:solidFill>
-              <a:ln w="12700">
-                <a:solidFill>
-                  <a:srgbClr val="C00000"/>
-                </a:solidFill>
-              </a:ln>
-              <a:effectLst/>
-            </c:spPr>
-          </c:marker>
-          <c:xVal>
-            <c:numRef>
-              <c:f>Sheet1!$I$32:$I$76</c:f>
-              <c:numCache>
-                <c:formatCode>General</c:formatCode>
-                <c:ptCount val="45"/>
-                <c:pt idx="0">
-                  <c:v>6</c:v>
-                </c:pt>
-                <c:pt idx="1">
-                  <c:v>7</c:v>
-                </c:pt>
-                <c:pt idx="2">
-                  <c:v>8</c:v>
-                </c:pt>
-                <c:pt idx="3">
-                  <c:v>9</c:v>
-                </c:pt>
-                <c:pt idx="4">
-                  <c:v>10</c:v>
-                </c:pt>
-                <c:pt idx="5">
-                  <c:v>11</c:v>
-                </c:pt>
-                <c:pt idx="6">
-                  <c:v>12</c:v>
-                </c:pt>
-                <c:pt idx="7">
-                  <c:v>13</c:v>
-                </c:pt>
-                <c:pt idx="8">
-                  <c:v>14</c:v>
-                </c:pt>
-                <c:pt idx="9">
-                  <c:v>15</c:v>
-                </c:pt>
-                <c:pt idx="10">
-                  <c:v>16</c:v>
-                </c:pt>
-                <c:pt idx="11">
-                  <c:v>17</c:v>
-                </c:pt>
-                <c:pt idx="12">
-                  <c:v>18</c:v>
-                </c:pt>
-                <c:pt idx="13">
-                  <c:v>19</c:v>
-                </c:pt>
-                <c:pt idx="14">
-                  <c:v>20</c:v>
-                </c:pt>
-                <c:pt idx="15">
-                  <c:v>21</c:v>
-                </c:pt>
-                <c:pt idx="16">
-                  <c:v>22</c:v>
-                </c:pt>
-                <c:pt idx="17">
-                  <c:v>23</c:v>
-                </c:pt>
-                <c:pt idx="18">
-                  <c:v>24</c:v>
-                </c:pt>
-                <c:pt idx="19">
-                  <c:v>25</c:v>
-                </c:pt>
-                <c:pt idx="20">
-                  <c:v>26</c:v>
-                </c:pt>
-                <c:pt idx="21">
-                  <c:v>27</c:v>
-                </c:pt>
-                <c:pt idx="22">
-                  <c:v>28</c:v>
-                </c:pt>
-                <c:pt idx="23">
-                  <c:v>29</c:v>
-                </c:pt>
-                <c:pt idx="24">
-                  <c:v>30</c:v>
-                </c:pt>
-                <c:pt idx="25">
-                  <c:v>31</c:v>
-                </c:pt>
-                <c:pt idx="26">
-                  <c:v>32</c:v>
-                </c:pt>
-                <c:pt idx="27">
-                  <c:v>33</c:v>
-                </c:pt>
-                <c:pt idx="28">
-                  <c:v>34</c:v>
-                </c:pt>
-                <c:pt idx="29">
-                  <c:v>35</c:v>
-                </c:pt>
-                <c:pt idx="30">
-                  <c:v>36</c:v>
-                </c:pt>
-                <c:pt idx="31">
-                  <c:v>37</c:v>
-                </c:pt>
-                <c:pt idx="32">
-                  <c:v>38</c:v>
-                </c:pt>
-                <c:pt idx="33">
-                  <c:v>39</c:v>
-                </c:pt>
-                <c:pt idx="34">
-                  <c:v>40</c:v>
-                </c:pt>
-                <c:pt idx="35">
-                  <c:v>41</c:v>
-                </c:pt>
-                <c:pt idx="36">
-                  <c:v>42</c:v>
-                </c:pt>
-                <c:pt idx="37">
-                  <c:v>43</c:v>
-                </c:pt>
-                <c:pt idx="38">
-                  <c:v>44</c:v>
-                </c:pt>
-                <c:pt idx="39">
-                  <c:v>45</c:v>
-                </c:pt>
-                <c:pt idx="40">
-                  <c:v>46</c:v>
-                </c:pt>
-                <c:pt idx="41">
-                  <c:v>47</c:v>
-                </c:pt>
-                <c:pt idx="42">
-                  <c:v>48</c:v>
-                </c:pt>
-                <c:pt idx="43">
-                  <c:v>49</c:v>
-                </c:pt>
-                <c:pt idx="44">
-                  <c:v>50</c:v>
-                </c:pt>
-              </c:numCache>
-            </c:numRef>
-          </c:xVal>
-          <c:yVal>
-            <c:numRef>
-              <c:f>Sheet1!$O$32:$O$76</c:f>
-              <c:numCache>
-                <c:formatCode>0.0%</c:formatCode>
-                <c:ptCount val="45"/>
-                <c:pt idx="0">
-                  <c:v>0.80900000000000005</c:v>
-                </c:pt>
-                <c:pt idx="1">
-                  <c:v>0.67100000000000004</c:v>
-                </c:pt>
-                <c:pt idx="2">
-                  <c:v>0.58799999999999997</c:v>
-                </c:pt>
-                <c:pt idx="3">
-                  <c:v>0.51800000000000002</c:v>
-                </c:pt>
-                <c:pt idx="4">
-                  <c:v>0.46700000000000003</c:v>
-                </c:pt>
-                <c:pt idx="5">
-                  <c:v>0.42799999999999999</c:v>
-                </c:pt>
-                <c:pt idx="6">
-                  <c:v>0.39100000000000001</c:v>
-                </c:pt>
-                <c:pt idx="7">
-                  <c:v>0.35699999999999998</c:v>
-                </c:pt>
-                <c:pt idx="8">
-                  <c:v>0.32400000000000001</c:v>
-                </c:pt>
-                <c:pt idx="9">
-                  <c:v>0.69799999999999995</c:v>
-                </c:pt>
-                <c:pt idx="10">
-                  <c:v>0.69499999999999995</c:v>
-                </c:pt>
-                <c:pt idx="11">
-                  <c:v>0.68899999999999995</c:v>
-                </c:pt>
-                <c:pt idx="12">
-                  <c:v>0.68799999999999994</c:v>
-                </c:pt>
-                <c:pt idx="13">
-                  <c:v>0.68600000000000005</c:v>
-                </c:pt>
-                <c:pt idx="14">
-                  <c:v>0.68500000000000005</c:v>
-                </c:pt>
-                <c:pt idx="15">
-                  <c:v>0.68400000000000005</c:v>
-                </c:pt>
-                <c:pt idx="16">
-                  <c:v>0.64800000000000002</c:v>
-                </c:pt>
-                <c:pt idx="17">
-                  <c:v>0.63800000000000001</c:v>
-                </c:pt>
-                <c:pt idx="18">
-                  <c:v>0.63200000000000001</c:v>
-                </c:pt>
-                <c:pt idx="19">
-                  <c:v>0.628</c:v>
-                </c:pt>
-                <c:pt idx="20">
-                  <c:v>0.621</c:v>
-                </c:pt>
-                <c:pt idx="21">
-                  <c:v>0.61399999999999999</c:v>
-                </c:pt>
-                <c:pt idx="22">
-                  <c:v>0.61099999999999999</c:v>
-                </c:pt>
-                <c:pt idx="23">
-                  <c:v>0.60699999999999998</c:v>
-                </c:pt>
-                <c:pt idx="24">
-                  <c:v>0.60399999999999998</c:v>
-                </c:pt>
-                <c:pt idx="25">
-                  <c:v>0.59699999999999998</c:v>
-                </c:pt>
-                <c:pt idx="26">
-                  <c:v>0.59299999999999997</c:v>
-                </c:pt>
-                <c:pt idx="27">
-                  <c:v>0.59</c:v>
-                </c:pt>
-                <c:pt idx="28">
-                  <c:v>0.58899999999999997</c:v>
-                </c:pt>
-                <c:pt idx="29">
-                  <c:v>0.58599999999999997</c:v>
-                </c:pt>
-                <c:pt idx="30">
-                  <c:v>0.58599999999999997</c:v>
-                </c:pt>
-                <c:pt idx="31">
-                  <c:v>0.58199999999999996</c:v>
-                </c:pt>
-                <c:pt idx="32">
-                  <c:v>0.58199999999999996</c:v>
-                </c:pt>
-                <c:pt idx="33">
-                  <c:v>0.58299999999999996</c:v>
-                </c:pt>
-                <c:pt idx="34">
-                  <c:v>0.58199999999999996</c:v>
-                </c:pt>
-                <c:pt idx="35">
-                  <c:v>0.58299999999999996</c:v>
-                </c:pt>
-                <c:pt idx="36">
-                  <c:v>0.58599999999999997</c:v>
-                </c:pt>
-                <c:pt idx="37">
-                  <c:v>0.58599999999999997</c:v>
-                </c:pt>
-                <c:pt idx="38">
-                  <c:v>0.58699999999999997</c:v>
-                </c:pt>
-                <c:pt idx="39">
-                  <c:v>0.58730000000000004</c:v>
-                </c:pt>
-                <c:pt idx="40">
-                  <c:v>0.58730000000000004</c:v>
-                </c:pt>
-                <c:pt idx="41">
-                  <c:v>0.58730000000000004</c:v>
-                </c:pt>
-                <c:pt idx="42">
-                  <c:v>0.58730000000000004</c:v>
-                </c:pt>
-                <c:pt idx="43">
-                  <c:v>0.58730000000000004</c:v>
-                </c:pt>
-                <c:pt idx="44">
-                  <c:v>0.58730000000000004</c:v>
-                </c:pt>
-              </c:numCache>
-            </c:numRef>
-          </c:yVal>
-          <c:smooth val="0"/>
-          <c:extLst>
-            <c:ext xmlns:c16="http://schemas.microsoft.com/office/drawing/2014/chart" uri="{C3380CC4-5D6E-409C-BE32-E72D297353CC}">
-              <c16:uniqueId val="{00000001-11EB-4395-A546-036DE7D930CB}"/>
+              <c16:uniqueId val="{00000001-2C3D-46AE-A52E-E214531E5C0E}"/>
             </c:ext>
           </c:extLst>
         </c:ser>
@@ -2389,7 +2389,7 @@
           <c:smooth val="0"/>
           <c:extLst>
             <c:ext xmlns:c16="http://schemas.microsoft.com/office/drawing/2014/chart" uri="{C3380CC4-5D6E-409C-BE32-E72D297353CC}">
-              <c16:uniqueId val="{00000002-11EB-4395-A546-036DE7D930CB}"/>
+              <c16:uniqueId val="{00000002-2C3D-46AE-A52E-E214531E5C0E}"/>
             </c:ext>
           </c:extLst>
         </c:ser>
@@ -2573,7 +2573,7 @@
             <c:manualLayout>
               <c:xMode val="edge"/>
               <c:yMode val="edge"/>
-              <c:x val="3.9561305616537248E-3"/>
+              <c:x val="6.0667454430920562E-3"/>
               <c:y val="0.13558034412365122"/>
             </c:manualLayout>
           </c:layout>
@@ -2630,6 +2630,16 @@
     </c:plotArea>
     <c:legend>
       <c:legendPos val="r"/>
+      <c:layout>
+        <c:manualLayout>
+          <c:xMode val="edge"/>
+          <c:yMode val="edge"/>
+          <c:x val="0.83945286383766182"/>
+          <c:y val="0.45456401283172937"/>
+          <c:w val="0.15652491449611855"/>
+          <c:h val="0.18750131233595801"/>
+        </c:manualLayout>
+      </c:layout>
       <c:overlay val="0"/>
       <c:spPr>
         <a:noFill/>
@@ -8437,36 +8447,6 @@
           </a:graphicData>
         </a:graphic>
       </p:graphicFrame>
-      <p:graphicFrame>
-        <p:nvGraphicFramePr>
-          <p:cNvPr id="7" name="Chart 6">
-            <a:extLst>
-              <a:ext uri="{FF2B5EF4-FFF2-40B4-BE49-F238E27FC236}">
-                <a16:creationId xmlns:a16="http://schemas.microsoft.com/office/drawing/2014/main" id="{59787BA4-D6A4-4EE0-987F-6D0EB05AE6A2}"/>
-              </a:ext>
-            </a:extLst>
-          </p:cNvPr>
-          <p:cNvGraphicFramePr>
-            <a:graphicFrameLocks/>
-          </p:cNvGraphicFramePr>
-          <p:nvPr>
-            <p:extLst>
-              <p:ext uri="{D42A27DB-BD31-4B8C-83A1-F6EECF244321}">
-                <p14:modId xmlns:p14="http://schemas.microsoft.com/office/powerpoint/2010/main" val="18954255"/>
-              </p:ext>
-            </p:extLst>
-          </p:nvPr>
-        </p:nvGraphicFramePr>
-        <p:xfrm>
-          <a:off x="5771585" y="3429000"/>
-          <a:ext cx="6420415" cy="3429000"/>
-        </p:xfrm>
-        <a:graphic>
-          <a:graphicData uri="http://schemas.openxmlformats.org/drawingml/2006/chart">
-            <c:chart xmlns:c="http://schemas.openxmlformats.org/drawingml/2006/chart" xmlns:r="http://schemas.openxmlformats.org/officeDocument/2006/relationships" r:id="rId4"/>
-          </a:graphicData>
-        </a:graphic>
-      </p:graphicFrame>
       <p:pic>
         <p:nvPicPr>
           <p:cNvPr id="3" name="Picture 2">
@@ -8482,7 +8462,7 @@
           <p:nvPr/>
         </p:nvPicPr>
         <p:blipFill>
-          <a:blip r:embed="rId5"/>
+          <a:blip r:embed="rId4"/>
           <a:stretch>
             <a:fillRect/>
           </a:stretch>
@@ -8512,7 +8492,7 @@
           <p:nvPr/>
         </p:nvPicPr>
         <p:blipFill>
-          <a:blip r:embed="rId6"/>
+          <a:blip r:embed="rId5"/>
           <a:stretch>
             <a:fillRect/>
           </a:stretch>
@@ -8527,6 +8507,36 @@
           </a:prstGeom>
         </p:spPr>
       </p:pic>
+      <p:graphicFrame>
+        <p:nvGraphicFramePr>
+          <p:cNvPr id="2" name="Chart 1">
+            <a:extLst>
+              <a:ext uri="{FF2B5EF4-FFF2-40B4-BE49-F238E27FC236}">
+                <a16:creationId xmlns:a16="http://schemas.microsoft.com/office/drawing/2014/main" id="{59787BA4-D6A4-4EE0-987F-6D0EB05AE6A2}"/>
+              </a:ext>
+            </a:extLst>
+          </p:cNvPr>
+          <p:cNvGraphicFramePr>
+            <a:graphicFrameLocks/>
+          </p:cNvGraphicFramePr>
+          <p:nvPr>
+            <p:extLst>
+              <p:ext uri="{D42A27DB-BD31-4B8C-83A1-F6EECF244321}">
+                <p14:modId xmlns:p14="http://schemas.microsoft.com/office/powerpoint/2010/main" val="1009066171"/>
+              </p:ext>
+            </p:extLst>
+          </p:nvPr>
+        </p:nvGraphicFramePr>
+        <p:xfrm>
+          <a:off x="5771585" y="3436574"/>
+          <a:ext cx="6314918" cy="3429000"/>
+        </p:xfrm>
+        <a:graphic>
+          <a:graphicData uri="http://schemas.openxmlformats.org/drawingml/2006/chart">
+            <c:chart xmlns:c="http://schemas.openxmlformats.org/drawingml/2006/chart" xmlns:r="http://schemas.openxmlformats.org/officeDocument/2006/relationships" r:id="rId6"/>
+          </a:graphicData>
+        </a:graphic>
+      </p:graphicFrame>
     </p:spTree>
     <p:extLst>
       <p:ext uri="{BB962C8B-B14F-4D97-AF65-F5344CB8AC3E}">

</xml_diff>

<commit_message>
Update Volve PNA figure
Updated figure to use wt% instead of mol% fractions.
</commit_message>
<xml_diff>
--- a/images/Analysis/c7plus-characterisation/c7plus-characterisation-images.pptx
+++ b/images/Analysis/c7plus-characterisation/c7plus-characterisation-images.pptx
@@ -118,20 +118,24 @@
   <p:extLst>
     <p:ext uri="{521415D9-36F7-43E2-AB2F-B90AF26B5E84}">
       <p14:sectionLst xmlns:p14="http://schemas.microsoft.com/office/powerpoint/2010/main">
-        <p14:section name="Default Section" id="{10FFFD92-D0C3-4009-B8C4-09A2E9AAAAEE}">
+        <p14:section name="Part I" id="{10FFFD92-D0C3-4009-B8C4-09A2E9AAAAEE}">
           <p14:sldIdLst>
             <p14:sldId id="256"/>
             <p14:sldId id="257"/>
+          </p14:sldIdLst>
+        </p14:section>
+        <p14:section name="Part II" id="{E20C6CB3-CB6C-470A-B5BC-DAFE1AC5C72F}">
+          <p14:sldIdLst>
             <p14:sldId id="260"/>
             <p14:sldId id="262"/>
             <p14:sldId id="263"/>
             <p14:sldId id="264"/>
+            <p14:sldId id="265"/>
+            <p14:sldId id="261"/>
           </p14:sldIdLst>
         </p14:section>
         <p14:section name="Untitled Section" id="{1AF52131-0820-4E43-9032-50A4690FC807}">
           <p14:sldIdLst>
-            <p14:sldId id="265"/>
-            <p14:sldId id="261"/>
             <p14:sldId id="258"/>
           </p14:sldIdLst>
         </p14:section>
@@ -4384,9 +4388,7 @@
                   <a:pPr>
                     <a:defRPr sz="1200" b="0" i="0" u="none" strike="noStrike" kern="1200" baseline="0">
                       <a:solidFill>
-                        <a:schemeClr val="bg1">
-                          <a:lumMod val="50000"/>
-                        </a:schemeClr>
+                        <a:schemeClr val="tx1"/>
                       </a:solidFill>
                       <a:latin typeface="+mn-lt"/>
                       <a:ea typeface="+mn-ea"/>
@@ -6404,9 +6406,7 @@
                   <a:pPr>
                     <a:defRPr sz="1200" b="0" i="0" u="none" strike="noStrike" kern="1200" baseline="0">
                       <a:solidFill>
-                        <a:schemeClr val="bg1">
-                          <a:lumMod val="50000"/>
-                        </a:schemeClr>
+                        <a:schemeClr val="tx1"/>
                       </a:solidFill>
                       <a:latin typeface="+mn-lt"/>
                       <a:ea typeface="+mn-ea"/>
@@ -7740,7 +7740,7 @@
                   <a:pPr>
                     <a:defRPr sz="1200" b="0" i="0" u="none" strike="noStrike" kern="1200" baseline="0">
                       <a:solidFill>
-                        <a:schemeClr val="accent2"/>
+                        <a:srgbClr val="FF6600"/>
                       </a:solidFill>
                       <a:latin typeface="+mn-lt"/>
                       <a:ea typeface="+mn-ea"/>
@@ -8221,7 +8221,7 @@
                 <a:pPr>
                   <a:defRPr sz="1000" b="0" i="0" u="none" strike="noStrike" kern="1200" baseline="0">
                     <a:solidFill>
-                      <a:srgbClr val="FF9900"/>
+                      <a:srgbClr val="FF6600"/>
                     </a:solidFill>
                     <a:latin typeface="+mn-lt"/>
                     <a:ea typeface="+mn-ea"/>
@@ -8231,7 +8231,7 @@
                 <a:r>
                   <a:rPr lang="en-AU">
                     <a:solidFill>
-                      <a:srgbClr val="FF9900"/>
+                      <a:srgbClr val="FF6600"/>
                     </a:solidFill>
                   </a:rPr>
                   <a:t>nC/SG</a:t>
@@ -8254,7 +8254,7 @@
               <a:pPr>
                 <a:defRPr sz="1000" b="0" i="0" u="none" strike="noStrike" kern="1200" baseline="0">
                   <a:solidFill>
-                    <a:srgbClr val="FF9900"/>
+                    <a:srgbClr val="FF6600"/>
                   </a:solidFill>
                   <a:latin typeface="+mn-lt"/>
                   <a:ea typeface="+mn-ea"/>
@@ -8289,7 +8289,7 @@
             <a:pPr>
               <a:defRPr sz="900" b="0" i="0" u="none" strike="noStrike" kern="1200" baseline="0">
                 <a:solidFill>
-                  <a:srgbClr val="FF9900"/>
+                  <a:srgbClr val="FF6600"/>
                 </a:solidFill>
                 <a:latin typeface="+mn-lt"/>
                 <a:ea typeface="+mn-ea"/>
@@ -8500,9 +8500,7 @@
                   <a:pPr>
                     <a:defRPr sz="1200" b="0" i="0" u="none" strike="noStrike" kern="1200" baseline="0">
                       <a:solidFill>
-                        <a:schemeClr val="bg1">
-                          <a:lumMod val="50000"/>
-                        </a:schemeClr>
+                        <a:schemeClr val="tx1"/>
                       </a:solidFill>
                       <a:latin typeface="+mn-lt"/>
                       <a:ea typeface="+mn-ea"/>
@@ -10256,7 +10254,7 @@
                   <a:pPr>
                     <a:defRPr sz="1200" b="0" i="0" u="none" strike="noStrike" kern="1200" baseline="0">
                       <a:solidFill>
-                        <a:srgbClr val="00B050"/>
+                        <a:srgbClr val="006600"/>
                       </a:solidFill>
                       <a:latin typeface="+mn-lt"/>
                       <a:ea typeface="+mn-ea"/>
@@ -10737,7 +10735,7 @@
                 <a:pPr>
                   <a:defRPr sz="1000" b="0" i="0" u="none" strike="noStrike" kern="1200" baseline="0">
                     <a:solidFill>
-                      <a:srgbClr val="00B050"/>
+                      <a:srgbClr val="006600"/>
                     </a:solidFill>
                     <a:latin typeface="+mn-lt"/>
                     <a:ea typeface="+mn-ea"/>
@@ -10747,7 +10745,7 @@
                 <a:r>
                   <a:rPr lang="en-AU">
                     <a:solidFill>
-                      <a:srgbClr val="00B050"/>
+                      <a:srgbClr val="006600"/>
                     </a:solidFill>
                   </a:rPr>
                   <a:t>nC/SG</a:t>
@@ -10770,7 +10768,7 @@
               <a:pPr>
                 <a:defRPr sz="1000" b="0" i="0" u="none" strike="noStrike" kern="1200" baseline="0">
                   <a:solidFill>
-                    <a:srgbClr val="00B050"/>
+                    <a:srgbClr val="006600"/>
                   </a:solidFill>
                   <a:latin typeface="+mn-lt"/>
                   <a:ea typeface="+mn-ea"/>
@@ -10805,7 +10803,7 @@
             <a:pPr>
               <a:defRPr sz="900" b="0" i="0" u="none" strike="noStrike" kern="1200" baseline="0">
                 <a:solidFill>
-                  <a:srgbClr val="00B050"/>
+                  <a:srgbClr val="006600"/>
                 </a:solidFill>
                 <a:latin typeface="+mn-lt"/>
                 <a:ea typeface="+mn-ea"/>
@@ -11462,6 +11460,924 @@
 </file>
 
 <file path=ppt/charts/chart16.xml><?xml version="1.0" encoding="utf-8"?>
+<c:chartSpace xmlns:c="http://schemas.openxmlformats.org/drawingml/2006/chart" xmlns:a="http://schemas.openxmlformats.org/drawingml/2006/main" xmlns:r="http://schemas.openxmlformats.org/officeDocument/2006/relationships" xmlns:c16r2="http://schemas.microsoft.com/office/drawing/2015/06/chart">
+  <c:date1904 val="0"/>
+  <c:lang val="en-GB"/>
+  <c:roundedCorners val="0"/>
+  <mc:AlternateContent xmlns:mc="http://schemas.openxmlformats.org/markup-compatibility/2006">
+    <mc:Choice xmlns:c14="http://schemas.microsoft.com/office/drawing/2007/8/2/chart" Requires="c14">
+      <c14:style val="102"/>
+    </mc:Choice>
+    <mc:Fallback>
+      <c:style val="2"/>
+    </mc:Fallback>
+  </mc:AlternateContent>
+  <c:chart>
+    <c:title>
+      <c:tx>
+        <c:rich>
+          <a:bodyPr rot="0" spcFirstLastPara="1" vertOverflow="ellipsis" vert="horz" wrap="square" anchor="ctr" anchorCtr="1"/>
+          <a:lstStyle/>
+          <a:p>
+            <a:pPr>
+              <a:defRPr sz="1400" b="0" i="0" u="none" strike="noStrike" kern="1200" spc="0" baseline="0">
+                <a:solidFill>
+                  <a:schemeClr val="tx1">
+                    <a:lumMod val="65000"/>
+                    <a:lumOff val="35000"/>
+                  </a:schemeClr>
+                </a:solidFill>
+                <a:latin typeface="+mn-lt"/>
+                <a:ea typeface="+mn-ea"/>
+                <a:cs typeface="+mn-cs"/>
+              </a:defRPr>
+            </a:pPr>
+            <a:r>
+              <a:rPr lang="en-AU" dirty="0"/>
+              <a:t>Volve PNA Composition</a:t>
+            </a:r>
+          </a:p>
+        </c:rich>
+      </c:tx>
+      <c:overlay val="0"/>
+      <c:spPr>
+        <a:noFill/>
+        <a:ln>
+          <a:noFill/>
+        </a:ln>
+        <a:effectLst/>
+      </c:spPr>
+    </c:title>
+    <c:autoTitleDeleted val="0"/>
+    <c:plotArea>
+      <c:layout/>
+      <c:scatterChart>
+        <c:scatterStyle val="lineMarker"/>
+        <c:varyColors val="0"/>
+        <c:ser>
+          <c:idx val="1"/>
+          <c:order val="0"/>
+          <c:tx>
+            <c:v>Paraffins</c:v>
+          </c:tx>
+          <c:spPr>
+            <a:ln w="31750" cap="rnd">
+              <a:solidFill>
+                <a:srgbClr val="C00000"/>
+              </a:solidFill>
+              <a:round/>
+            </a:ln>
+            <a:effectLst/>
+          </c:spPr>
+          <c:marker>
+            <c:symbol val="circle"/>
+            <c:size val="5"/>
+            <c:spPr>
+              <a:solidFill>
+                <a:srgbClr val="FF9999"/>
+              </a:solidFill>
+              <a:ln w="12700">
+                <a:solidFill>
+                  <a:srgbClr val="C00000"/>
+                </a:solidFill>
+              </a:ln>
+              <a:effectLst/>
+            </c:spPr>
+          </c:marker>
+          <c:xVal>
+            <c:numRef>
+              <c:f>PyrusData!$K$8:$K$22</c:f>
+              <c:numCache>
+                <c:formatCode>General</c:formatCode>
+                <c:ptCount val="15"/>
+                <c:pt idx="0">
+                  <c:v>6</c:v>
+                </c:pt>
+                <c:pt idx="1">
+                  <c:v>7</c:v>
+                </c:pt>
+                <c:pt idx="2">
+                  <c:v>8</c:v>
+                </c:pt>
+                <c:pt idx="3">
+                  <c:v>9</c:v>
+                </c:pt>
+                <c:pt idx="4">
+                  <c:v>10</c:v>
+                </c:pt>
+                <c:pt idx="5">
+                  <c:v>11</c:v>
+                </c:pt>
+                <c:pt idx="6">
+                  <c:v>12</c:v>
+                </c:pt>
+                <c:pt idx="7">
+                  <c:v>13</c:v>
+                </c:pt>
+                <c:pt idx="8">
+                  <c:v>14</c:v>
+                </c:pt>
+                <c:pt idx="9">
+                  <c:v>15</c:v>
+                </c:pt>
+                <c:pt idx="10">
+                  <c:v>16</c:v>
+                </c:pt>
+                <c:pt idx="11">
+                  <c:v>17</c:v>
+                </c:pt>
+                <c:pt idx="12">
+                  <c:v>18</c:v>
+                </c:pt>
+                <c:pt idx="13">
+                  <c:v>19</c:v>
+                </c:pt>
+                <c:pt idx="14">
+                  <c:v>20</c:v>
+                </c:pt>
+              </c:numCache>
+            </c:numRef>
+          </c:xVal>
+          <c:yVal>
+            <c:numRef>
+              <c:f>PyrusData!$S$8:$S$22</c:f>
+              <c:numCache>
+                <c:formatCode>General</c:formatCode>
+                <c:ptCount val="15"/>
+                <c:pt idx="0">
+                  <c:v>0.96399999999999997</c:v>
+                </c:pt>
+                <c:pt idx="1">
+                  <c:v>0.74299999999999999</c:v>
+                </c:pt>
+                <c:pt idx="2">
+                  <c:v>0.68</c:v>
+                </c:pt>
+                <c:pt idx="3">
+                  <c:v>0.624</c:v>
+                </c:pt>
+                <c:pt idx="4">
+                  <c:v>0.57399999999999995</c:v>
+                </c:pt>
+                <c:pt idx="5">
+                  <c:v>0.56599999999999995</c:v>
+                </c:pt>
+                <c:pt idx="6">
+                  <c:v>0.51700000000000002</c:v>
+                </c:pt>
+                <c:pt idx="7">
+                  <c:v>0.48499999999999999</c:v>
+                </c:pt>
+                <c:pt idx="8">
+                  <c:v>0.45800000000000002</c:v>
+                </c:pt>
+                <c:pt idx="9">
+                  <c:v>0.44800000000000001</c:v>
+                </c:pt>
+                <c:pt idx="10">
+                  <c:v>0.436</c:v>
+                </c:pt>
+                <c:pt idx="11">
+                  <c:v>0.46300000000000002</c:v>
+                </c:pt>
+                <c:pt idx="12">
+                  <c:v>0.44400000000000001</c:v>
+                </c:pt>
+                <c:pt idx="13">
+                  <c:v>0.436</c:v>
+                </c:pt>
+                <c:pt idx="14">
+                  <c:v>0.19400000000000001</c:v>
+                </c:pt>
+              </c:numCache>
+            </c:numRef>
+          </c:yVal>
+          <c:smooth val="0"/>
+          <c:extLst>
+            <c:ext xmlns:c16="http://schemas.microsoft.com/office/drawing/2014/chart" uri="{C3380CC4-5D6E-409C-BE32-E72D297353CC}">
+              <c16:uniqueId val="{00000000-B3D4-4FE4-BD06-5645F96A6C5C}"/>
+            </c:ext>
+          </c:extLst>
+        </c:ser>
+        <c:ser>
+          <c:idx val="0"/>
+          <c:order val="1"/>
+          <c:tx>
+            <c:v>Naphthenes</c:v>
+          </c:tx>
+          <c:spPr>
+            <a:ln w="31750" cap="rnd">
+              <a:solidFill>
+                <a:srgbClr val="FF9900"/>
+              </a:solidFill>
+              <a:round/>
+            </a:ln>
+            <a:effectLst/>
+          </c:spPr>
+          <c:marker>
+            <c:symbol val="circle"/>
+            <c:size val="5"/>
+            <c:spPr>
+              <a:solidFill>
+                <a:srgbClr val="FFCC66"/>
+              </a:solidFill>
+              <a:ln w="12700">
+                <a:solidFill>
+                  <a:srgbClr val="FF9900"/>
+                </a:solidFill>
+              </a:ln>
+              <a:effectLst/>
+            </c:spPr>
+          </c:marker>
+          <c:xVal>
+            <c:numRef>
+              <c:f>PyrusData!$K$8:$K$22</c:f>
+              <c:numCache>
+                <c:formatCode>General</c:formatCode>
+                <c:ptCount val="15"/>
+                <c:pt idx="0">
+                  <c:v>6</c:v>
+                </c:pt>
+                <c:pt idx="1">
+                  <c:v>7</c:v>
+                </c:pt>
+                <c:pt idx="2">
+                  <c:v>8</c:v>
+                </c:pt>
+                <c:pt idx="3">
+                  <c:v>9</c:v>
+                </c:pt>
+                <c:pt idx="4">
+                  <c:v>10</c:v>
+                </c:pt>
+                <c:pt idx="5">
+                  <c:v>11</c:v>
+                </c:pt>
+                <c:pt idx="6">
+                  <c:v>12</c:v>
+                </c:pt>
+                <c:pt idx="7">
+                  <c:v>13</c:v>
+                </c:pt>
+                <c:pt idx="8">
+                  <c:v>14</c:v>
+                </c:pt>
+                <c:pt idx="9">
+                  <c:v>15</c:v>
+                </c:pt>
+                <c:pt idx="10">
+                  <c:v>16</c:v>
+                </c:pt>
+                <c:pt idx="11">
+                  <c:v>17</c:v>
+                </c:pt>
+                <c:pt idx="12">
+                  <c:v>18</c:v>
+                </c:pt>
+                <c:pt idx="13">
+                  <c:v>19</c:v>
+                </c:pt>
+                <c:pt idx="14">
+                  <c:v>20</c:v>
+                </c:pt>
+              </c:numCache>
+            </c:numRef>
+          </c:xVal>
+          <c:yVal>
+            <c:numRef>
+              <c:f>PyrusData!$T$8:$T$22</c:f>
+              <c:numCache>
+                <c:formatCode>General</c:formatCode>
+                <c:ptCount val="15"/>
+                <c:pt idx="0">
+                  <c:v>1.4400000000000001E-3</c:v>
+                </c:pt>
+                <c:pt idx="1">
+                  <c:v>0.161</c:v>
+                </c:pt>
+                <c:pt idx="2">
+                  <c:v>0.193</c:v>
+                </c:pt>
+                <c:pt idx="3">
+                  <c:v>0.219</c:v>
+                </c:pt>
+                <c:pt idx="4">
+                  <c:v>0.23799999999999999</c:v>
+                </c:pt>
+                <c:pt idx="5">
+                  <c:v>0.246</c:v>
+                </c:pt>
+                <c:pt idx="6">
+                  <c:v>0.25800000000000001</c:v>
+                </c:pt>
+                <c:pt idx="7">
+                  <c:v>0.26600000000000001</c:v>
+                </c:pt>
+                <c:pt idx="8">
+                  <c:v>0.27</c:v>
+                </c:pt>
+                <c:pt idx="9">
+                  <c:v>0.26100000000000001</c:v>
+                </c:pt>
+                <c:pt idx="10">
+                  <c:v>0.249</c:v>
+                </c:pt>
+                <c:pt idx="11">
+                  <c:v>0.23</c:v>
+                </c:pt>
+                <c:pt idx="12">
+                  <c:v>0.27300000000000002</c:v>
+                </c:pt>
+                <c:pt idx="13">
+                  <c:v>0.254</c:v>
+                </c:pt>
+                <c:pt idx="14">
+                  <c:v>0.154</c:v>
+                </c:pt>
+              </c:numCache>
+            </c:numRef>
+          </c:yVal>
+          <c:smooth val="0"/>
+          <c:extLst>
+            <c:ext xmlns:c16="http://schemas.microsoft.com/office/drawing/2014/chart" uri="{C3380CC4-5D6E-409C-BE32-E72D297353CC}">
+              <c16:uniqueId val="{00000001-B3D4-4FE4-BD06-5645F96A6C5C}"/>
+            </c:ext>
+          </c:extLst>
+        </c:ser>
+        <c:ser>
+          <c:idx val="3"/>
+          <c:order val="2"/>
+          <c:tx>
+            <c:v>Aromatics</c:v>
+          </c:tx>
+          <c:spPr>
+            <a:ln w="31750">
+              <a:solidFill>
+                <a:srgbClr val="006600"/>
+              </a:solidFill>
+            </a:ln>
+          </c:spPr>
+          <c:marker>
+            <c:symbol val="circle"/>
+            <c:size val="5"/>
+            <c:spPr>
+              <a:solidFill>
+                <a:srgbClr val="99FF66"/>
+              </a:solidFill>
+              <a:ln w="12700">
+                <a:solidFill>
+                  <a:srgbClr val="006600"/>
+                </a:solidFill>
+              </a:ln>
+            </c:spPr>
+          </c:marker>
+          <c:xVal>
+            <c:numRef>
+              <c:f>PyrusData!$K$8:$K$22</c:f>
+              <c:numCache>
+                <c:formatCode>General</c:formatCode>
+                <c:ptCount val="15"/>
+                <c:pt idx="0">
+                  <c:v>6</c:v>
+                </c:pt>
+                <c:pt idx="1">
+                  <c:v>7</c:v>
+                </c:pt>
+                <c:pt idx="2">
+                  <c:v>8</c:v>
+                </c:pt>
+                <c:pt idx="3">
+                  <c:v>9</c:v>
+                </c:pt>
+                <c:pt idx="4">
+                  <c:v>10</c:v>
+                </c:pt>
+                <c:pt idx="5">
+                  <c:v>11</c:v>
+                </c:pt>
+                <c:pt idx="6">
+                  <c:v>12</c:v>
+                </c:pt>
+                <c:pt idx="7">
+                  <c:v>13</c:v>
+                </c:pt>
+                <c:pt idx="8">
+                  <c:v>14</c:v>
+                </c:pt>
+                <c:pt idx="9">
+                  <c:v>15</c:v>
+                </c:pt>
+                <c:pt idx="10">
+                  <c:v>16</c:v>
+                </c:pt>
+                <c:pt idx="11">
+                  <c:v>17</c:v>
+                </c:pt>
+                <c:pt idx="12">
+                  <c:v>18</c:v>
+                </c:pt>
+                <c:pt idx="13">
+                  <c:v>19</c:v>
+                </c:pt>
+                <c:pt idx="14">
+                  <c:v>20</c:v>
+                </c:pt>
+              </c:numCache>
+            </c:numRef>
+          </c:xVal>
+          <c:yVal>
+            <c:numRef>
+              <c:f>PyrusData!$U$8:$U$22</c:f>
+              <c:numCache>
+                <c:formatCode>General</c:formatCode>
+                <c:ptCount val="15"/>
+                <c:pt idx="0">
+                  <c:v>3.4700000000000002E-2</c:v>
+                </c:pt>
+                <c:pt idx="1">
+                  <c:v>9.6000000000000002E-2</c:v>
+                </c:pt>
+                <c:pt idx="2">
+                  <c:v>0.126</c:v>
+                </c:pt>
+                <c:pt idx="3">
+                  <c:v>0.157</c:v>
+                </c:pt>
+                <c:pt idx="4">
+                  <c:v>0.189</c:v>
+                </c:pt>
+                <c:pt idx="5">
+                  <c:v>0.188</c:v>
+                </c:pt>
+                <c:pt idx="6">
+                  <c:v>0.22500000000000001</c:v>
+                </c:pt>
+                <c:pt idx="7">
+                  <c:v>0.249</c:v>
+                </c:pt>
+                <c:pt idx="8">
+                  <c:v>0.27200000000000002</c:v>
+                </c:pt>
+                <c:pt idx="9">
+                  <c:v>0.29099999999999998</c:v>
+                </c:pt>
+                <c:pt idx="10">
+                  <c:v>0.315</c:v>
+                </c:pt>
+                <c:pt idx="11">
+                  <c:v>0.30599999999999999</c:v>
+                </c:pt>
+                <c:pt idx="12">
+                  <c:v>0.28299999999999997</c:v>
+                </c:pt>
+                <c:pt idx="13">
+                  <c:v>0.311</c:v>
+                </c:pt>
+                <c:pt idx="14">
+                  <c:v>0.65200000000000002</c:v>
+                </c:pt>
+              </c:numCache>
+            </c:numRef>
+          </c:yVal>
+          <c:smooth val="0"/>
+          <c:extLst>
+            <c:ext xmlns:c16="http://schemas.microsoft.com/office/drawing/2014/chart" uri="{C3380CC4-5D6E-409C-BE32-E72D297353CC}">
+              <c16:uniqueId val="{00000002-B3D4-4FE4-BD06-5645F96A6C5C}"/>
+            </c:ext>
+          </c:extLst>
+        </c:ser>
+        <c:ser>
+          <c:idx val="2"/>
+          <c:order val="3"/>
+          <c:tx>
+            <c:v>Measured A%</c:v>
+          </c:tx>
+          <c:spPr>
+            <a:ln w="12700">
+              <a:solidFill>
+                <a:schemeClr val="tx1"/>
+              </a:solidFill>
+            </a:ln>
+          </c:spPr>
+          <c:marker>
+            <c:symbol val="circle"/>
+            <c:size val="5"/>
+            <c:spPr>
+              <a:solidFill>
+                <a:schemeClr val="bg1">
+                  <a:lumMod val="85000"/>
+                </a:schemeClr>
+              </a:solidFill>
+              <a:ln>
+                <a:solidFill>
+                  <a:schemeClr val="tx1"/>
+                </a:solidFill>
+              </a:ln>
+            </c:spPr>
+          </c:marker>
+          <c:xVal>
+            <c:numRef>
+              <c:f>PyrusData!$K$8:$K$22</c:f>
+              <c:numCache>
+                <c:formatCode>General</c:formatCode>
+                <c:ptCount val="15"/>
+                <c:pt idx="0">
+                  <c:v>6</c:v>
+                </c:pt>
+                <c:pt idx="1">
+                  <c:v>7</c:v>
+                </c:pt>
+                <c:pt idx="2">
+                  <c:v>8</c:v>
+                </c:pt>
+                <c:pt idx="3">
+                  <c:v>9</c:v>
+                </c:pt>
+                <c:pt idx="4">
+                  <c:v>10</c:v>
+                </c:pt>
+                <c:pt idx="5">
+                  <c:v>11</c:v>
+                </c:pt>
+                <c:pt idx="6">
+                  <c:v>12</c:v>
+                </c:pt>
+                <c:pt idx="7">
+                  <c:v>13</c:v>
+                </c:pt>
+                <c:pt idx="8">
+                  <c:v>14</c:v>
+                </c:pt>
+                <c:pt idx="9">
+                  <c:v>15</c:v>
+                </c:pt>
+                <c:pt idx="10">
+                  <c:v>16</c:v>
+                </c:pt>
+                <c:pt idx="11">
+                  <c:v>17</c:v>
+                </c:pt>
+                <c:pt idx="12">
+                  <c:v>18</c:v>
+                </c:pt>
+                <c:pt idx="13">
+                  <c:v>19</c:v>
+                </c:pt>
+                <c:pt idx="14">
+                  <c:v>20</c:v>
+                </c:pt>
+              </c:numCache>
+            </c:numRef>
+          </c:xVal>
+          <c:yVal>
+            <c:numRef>
+              <c:f>PyrusData!$V$8:$V$22</c:f>
+              <c:numCache>
+                <c:formatCode>General</c:formatCode>
+                <c:ptCount val="15"/>
+                <c:pt idx="0">
+                  <c:v>0</c:v>
+                </c:pt>
+                <c:pt idx="1">
+                  <c:v>0.14499999999999999</c:v>
+                </c:pt>
+                <c:pt idx="2">
+                  <c:v>0.19500000000000001</c:v>
+                </c:pt>
+                <c:pt idx="3">
+                  <c:v>0.27399999999999997</c:v>
+                </c:pt>
+                <c:pt idx="4">
+                  <c:v>0.27200000000000002</c:v>
+                </c:pt>
+                <c:pt idx="5">
+                  <c:v>0.248</c:v>
+                </c:pt>
+                <c:pt idx="6">
+                  <c:v>0.253</c:v>
+                </c:pt>
+                <c:pt idx="7">
+                  <c:v>0.251</c:v>
+                </c:pt>
+                <c:pt idx="8">
+                  <c:v>0.25800000000000001</c:v>
+                </c:pt>
+                <c:pt idx="9">
+                  <c:v>0.309</c:v>
+                </c:pt>
+                <c:pt idx="10">
+                  <c:v>0.34499999999999997</c:v>
+                </c:pt>
+                <c:pt idx="11">
+                  <c:v>0.34700000000000003</c:v>
+                </c:pt>
+                <c:pt idx="12">
+                  <c:v>0.34299999999999997</c:v>
+                </c:pt>
+                <c:pt idx="13">
+                  <c:v>0.36700000000000005</c:v>
+                </c:pt>
+                <c:pt idx="14">
+                  <c:v>0.63400000000000001</c:v>
+                </c:pt>
+              </c:numCache>
+            </c:numRef>
+          </c:yVal>
+          <c:smooth val="0"/>
+          <c:extLst>
+            <c:ext xmlns:c16="http://schemas.microsoft.com/office/drawing/2014/chart" uri="{C3380CC4-5D6E-409C-BE32-E72D297353CC}">
+              <c16:uniqueId val="{00000003-B3D4-4FE4-BD06-5645F96A6C5C}"/>
+            </c:ext>
+          </c:extLst>
+        </c:ser>
+        <c:dLbls>
+          <c:showLegendKey val="0"/>
+          <c:showVal val="0"/>
+          <c:showCatName val="0"/>
+          <c:showSerName val="0"/>
+          <c:showPercent val="0"/>
+          <c:showBubbleSize val="0"/>
+        </c:dLbls>
+        <c:axId val="1205457728"/>
+        <c:axId val="1205456288"/>
+      </c:scatterChart>
+      <c:valAx>
+        <c:axId val="1205457728"/>
+        <c:scaling>
+          <c:orientation val="minMax"/>
+          <c:max val="20"/>
+          <c:min val="6"/>
+        </c:scaling>
+        <c:delete val="0"/>
+        <c:axPos val="b"/>
+        <c:majorGridlines>
+          <c:spPr>
+            <a:ln w="9525" cap="flat" cmpd="sng" algn="ctr">
+              <a:solidFill>
+                <a:schemeClr val="tx1">
+                  <a:lumMod val="15000"/>
+                  <a:lumOff val="85000"/>
+                </a:schemeClr>
+              </a:solidFill>
+              <a:round/>
+            </a:ln>
+            <a:effectLst/>
+          </c:spPr>
+        </c:majorGridlines>
+        <c:title>
+          <c:tx>
+            <c:rich>
+              <a:bodyPr rot="0" spcFirstLastPara="1" vertOverflow="ellipsis" vert="horz" wrap="square" anchor="ctr" anchorCtr="1"/>
+              <a:lstStyle/>
+              <a:p>
+                <a:pPr>
+                  <a:defRPr sz="1000" b="1" i="0" u="none" strike="noStrike" kern="1200" baseline="0">
+                    <a:solidFill>
+                      <a:schemeClr val="tx1">
+                        <a:lumMod val="65000"/>
+                        <a:lumOff val="35000"/>
+                      </a:schemeClr>
+                    </a:solidFill>
+                    <a:latin typeface="+mn-lt"/>
+                    <a:ea typeface="+mn-ea"/>
+                    <a:cs typeface="+mn-cs"/>
+                  </a:defRPr>
+                </a:pPr>
+                <a:r>
+                  <a:rPr lang="en-AU" b="1"/>
+                  <a:t>Volve</a:t>
+                </a:r>
+                <a:r>
+                  <a:rPr lang="en-AU" b="1" baseline="0"/>
+                  <a:t> SCN Fraction</a:t>
+                </a:r>
+                <a:endParaRPr lang="en-AU" b="1"/>
+              </a:p>
+            </c:rich>
+          </c:tx>
+          <c:layout>
+            <c:manualLayout>
+              <c:xMode val="edge"/>
+              <c:yMode val="edge"/>
+              <c:x val="0.33970652777777777"/>
+              <c:y val="0.92884166666666679"/>
+            </c:manualLayout>
+          </c:layout>
+          <c:overlay val="0"/>
+          <c:spPr>
+            <a:noFill/>
+            <a:ln>
+              <a:noFill/>
+            </a:ln>
+            <a:effectLst/>
+          </c:spPr>
+        </c:title>
+        <c:numFmt formatCode="General" sourceLinked="1"/>
+        <c:majorTickMark val="none"/>
+        <c:minorTickMark val="none"/>
+        <c:tickLblPos val="nextTo"/>
+        <c:spPr>
+          <a:noFill/>
+          <a:ln w="9525" cap="flat" cmpd="sng" algn="ctr">
+            <a:solidFill>
+              <a:schemeClr val="tx1">
+                <a:lumMod val="25000"/>
+                <a:lumOff val="75000"/>
+              </a:schemeClr>
+            </a:solidFill>
+            <a:round/>
+          </a:ln>
+          <a:effectLst/>
+        </c:spPr>
+        <c:txPr>
+          <a:bodyPr rot="-60000000" spcFirstLastPara="1" vertOverflow="ellipsis" vert="horz" wrap="square" anchor="ctr" anchorCtr="1"/>
+          <a:lstStyle/>
+          <a:p>
+            <a:pPr>
+              <a:defRPr sz="900" b="0" i="0" u="none" strike="noStrike" kern="1200" baseline="0">
+                <a:solidFill>
+                  <a:schemeClr val="tx1">
+                    <a:lumMod val="65000"/>
+                    <a:lumOff val="35000"/>
+                  </a:schemeClr>
+                </a:solidFill>
+                <a:latin typeface="+mn-lt"/>
+                <a:ea typeface="+mn-ea"/>
+                <a:cs typeface="+mn-cs"/>
+              </a:defRPr>
+            </a:pPr>
+            <a:endParaRPr lang="en-US"/>
+          </a:p>
+        </c:txPr>
+        <c:crossAx val="1205456288"/>
+        <c:crosses val="autoZero"/>
+        <c:crossBetween val="midCat"/>
+      </c:valAx>
+      <c:valAx>
+        <c:axId val="1205456288"/>
+        <c:scaling>
+          <c:orientation val="minMax"/>
+          <c:max val="1"/>
+        </c:scaling>
+        <c:delete val="0"/>
+        <c:axPos val="l"/>
+        <c:majorGridlines>
+          <c:spPr>
+            <a:ln w="9525" cap="flat" cmpd="sng" algn="ctr">
+              <a:solidFill>
+                <a:schemeClr val="tx1">
+                  <a:lumMod val="15000"/>
+                  <a:lumOff val="85000"/>
+                </a:schemeClr>
+              </a:solidFill>
+              <a:round/>
+            </a:ln>
+            <a:effectLst/>
+          </c:spPr>
+        </c:majorGridlines>
+        <c:title>
+          <c:tx>
+            <c:rich>
+              <a:bodyPr rot="-5400000" spcFirstLastPara="1" vertOverflow="ellipsis" vert="horz" wrap="square" anchor="ctr" anchorCtr="1"/>
+              <a:lstStyle/>
+              <a:p>
+                <a:pPr>
+                  <a:defRPr sz="1000" b="1" i="0" u="none" strike="noStrike" kern="1200" baseline="0">
+                    <a:solidFill>
+                      <a:schemeClr val="tx1">
+                        <a:lumMod val="65000"/>
+                        <a:lumOff val="35000"/>
+                      </a:schemeClr>
+                    </a:solidFill>
+                    <a:latin typeface="+mn-lt"/>
+                    <a:ea typeface="+mn-ea"/>
+                    <a:cs typeface="+mn-cs"/>
+                  </a:defRPr>
+                </a:pPr>
+                <a:r>
+                  <a:rPr lang="en-AU" b="1" dirty="0"/>
+                  <a:t>Mass Percentage</a:t>
+                </a:r>
+                <a:r>
+                  <a:rPr lang="en-AU" b="1" baseline="0" dirty="0"/>
+                  <a:t> </a:t>
+                </a:r>
+                <a:endParaRPr lang="en-AU" b="1" dirty="0"/>
+              </a:p>
+            </c:rich>
+          </c:tx>
+          <c:layout>
+            <c:manualLayout>
+              <c:xMode val="edge"/>
+              <c:yMode val="edge"/>
+              <c:x val="1.4111146752990135E-2"/>
+              <c:y val="0.26970164661144008"/>
+            </c:manualLayout>
+          </c:layout>
+          <c:overlay val="0"/>
+          <c:spPr>
+            <a:noFill/>
+            <a:ln>
+              <a:noFill/>
+            </a:ln>
+            <a:effectLst/>
+          </c:spPr>
+        </c:title>
+        <c:numFmt formatCode="0%" sourceLinked="0"/>
+        <c:majorTickMark val="none"/>
+        <c:minorTickMark val="none"/>
+        <c:tickLblPos val="nextTo"/>
+        <c:spPr>
+          <a:noFill/>
+          <a:ln w="9525" cap="flat" cmpd="sng" algn="ctr">
+            <a:solidFill>
+              <a:schemeClr val="tx1">
+                <a:lumMod val="25000"/>
+                <a:lumOff val="75000"/>
+              </a:schemeClr>
+            </a:solidFill>
+            <a:round/>
+          </a:ln>
+          <a:effectLst/>
+        </c:spPr>
+        <c:txPr>
+          <a:bodyPr rot="-60000000" spcFirstLastPara="1" vertOverflow="ellipsis" vert="horz" wrap="square" anchor="ctr" anchorCtr="1"/>
+          <a:lstStyle/>
+          <a:p>
+            <a:pPr>
+              <a:defRPr sz="900" b="0" i="0" u="none" strike="noStrike" kern="1200" baseline="0">
+                <a:solidFill>
+                  <a:schemeClr val="tx1">
+                    <a:lumMod val="65000"/>
+                    <a:lumOff val="35000"/>
+                  </a:schemeClr>
+                </a:solidFill>
+                <a:latin typeface="+mn-lt"/>
+                <a:ea typeface="+mn-ea"/>
+                <a:cs typeface="+mn-cs"/>
+              </a:defRPr>
+            </a:pPr>
+            <a:endParaRPr lang="en-US"/>
+          </a:p>
+        </c:txPr>
+        <c:crossAx val="1205457728"/>
+        <c:crosses val="autoZero"/>
+        <c:crossBetween val="midCat"/>
+      </c:valAx>
+    </c:plotArea>
+    <c:legend>
+      <c:legendPos val="r"/>
+      <c:overlay val="0"/>
+      <c:spPr>
+        <a:noFill/>
+        <a:ln>
+          <a:noFill/>
+        </a:ln>
+        <a:effectLst/>
+      </c:spPr>
+      <c:txPr>
+        <a:bodyPr rot="0" spcFirstLastPara="1" vertOverflow="ellipsis" vert="horz" wrap="square" anchor="ctr" anchorCtr="1"/>
+        <a:lstStyle/>
+        <a:p>
+          <a:pPr>
+            <a:defRPr sz="900" b="0" i="0" u="none" strike="noStrike" kern="1200" baseline="0">
+              <a:solidFill>
+                <a:schemeClr val="tx1">
+                  <a:lumMod val="65000"/>
+                  <a:lumOff val="35000"/>
+                </a:schemeClr>
+              </a:solidFill>
+              <a:latin typeface="+mn-lt"/>
+              <a:ea typeface="+mn-ea"/>
+              <a:cs typeface="+mn-cs"/>
+            </a:defRPr>
+          </a:pPr>
+          <a:endParaRPr lang="en-US"/>
+        </a:p>
+      </c:txPr>
+    </c:legend>
+    <c:plotVisOnly val="1"/>
+    <c:dispBlanksAs val="gap"/>
+    <c:showDLblsOverMax val="0"/>
+    <c:extLst/>
+  </c:chart>
+  <c:txPr>
+    <a:bodyPr/>
+    <a:lstStyle/>
+    <a:p>
+      <a:pPr>
+        <a:defRPr/>
+      </a:pPr>
+      <a:endParaRPr lang="en-US"/>
+    </a:p>
+  </c:txPr>
+  <c:externalData r:id="rId1">
+    <c:autoUpdate val="0"/>
+  </c:externalData>
+</c:chartSpace>
+</file>
+
+<file path=ppt/charts/chart17.xml><?xml version="1.0" encoding="utf-8"?>
 <c:chartSpace xmlns:c="http://schemas.openxmlformats.org/drawingml/2006/chart" xmlns:a="http://schemas.openxmlformats.org/drawingml/2006/main" xmlns:r="http://schemas.openxmlformats.org/officeDocument/2006/relationships" xmlns:c16r2="http://schemas.microsoft.com/office/drawing/2015/06/chart">
   <c:date1904 val="0"/>
   <c:lang val="en-GB"/>
@@ -12678,919 +13594,6 @@
               <c:yMode val="edge"/>
               <c:x val="1.4111085854630079E-2"/>
               <c:y val="0.14480187907913239"/>
-            </c:manualLayout>
-          </c:layout>
-          <c:overlay val="0"/>
-          <c:spPr>
-            <a:noFill/>
-            <a:ln>
-              <a:noFill/>
-            </a:ln>
-            <a:effectLst/>
-          </c:spPr>
-        </c:title>
-        <c:numFmt formatCode="0%" sourceLinked="0"/>
-        <c:majorTickMark val="none"/>
-        <c:minorTickMark val="none"/>
-        <c:tickLblPos val="nextTo"/>
-        <c:spPr>
-          <a:noFill/>
-          <a:ln w="9525" cap="flat" cmpd="sng" algn="ctr">
-            <a:solidFill>
-              <a:schemeClr val="tx1">
-                <a:lumMod val="25000"/>
-                <a:lumOff val="75000"/>
-              </a:schemeClr>
-            </a:solidFill>
-            <a:round/>
-          </a:ln>
-          <a:effectLst/>
-        </c:spPr>
-        <c:txPr>
-          <a:bodyPr rot="-60000000" spcFirstLastPara="1" vertOverflow="ellipsis" vert="horz" wrap="square" anchor="ctr" anchorCtr="1"/>
-          <a:lstStyle/>
-          <a:p>
-            <a:pPr>
-              <a:defRPr sz="900" b="0" i="0" u="none" strike="noStrike" kern="1200" baseline="0">
-                <a:solidFill>
-                  <a:schemeClr val="tx1">
-                    <a:lumMod val="65000"/>
-                    <a:lumOff val="35000"/>
-                  </a:schemeClr>
-                </a:solidFill>
-                <a:latin typeface="+mn-lt"/>
-                <a:ea typeface="+mn-ea"/>
-                <a:cs typeface="+mn-cs"/>
-              </a:defRPr>
-            </a:pPr>
-            <a:endParaRPr lang="en-US"/>
-          </a:p>
-        </c:txPr>
-        <c:crossAx val="1205457728"/>
-        <c:crosses val="autoZero"/>
-        <c:crossBetween val="midCat"/>
-      </c:valAx>
-    </c:plotArea>
-    <c:legend>
-      <c:legendPos val="r"/>
-      <c:overlay val="0"/>
-      <c:spPr>
-        <a:noFill/>
-        <a:ln>
-          <a:noFill/>
-        </a:ln>
-        <a:effectLst/>
-      </c:spPr>
-      <c:txPr>
-        <a:bodyPr rot="0" spcFirstLastPara="1" vertOverflow="ellipsis" vert="horz" wrap="square" anchor="ctr" anchorCtr="1"/>
-        <a:lstStyle/>
-        <a:p>
-          <a:pPr>
-            <a:defRPr sz="900" b="0" i="0" u="none" strike="noStrike" kern="1200" baseline="0">
-              <a:solidFill>
-                <a:schemeClr val="tx1">
-                  <a:lumMod val="65000"/>
-                  <a:lumOff val="35000"/>
-                </a:schemeClr>
-              </a:solidFill>
-              <a:latin typeface="+mn-lt"/>
-              <a:ea typeface="+mn-ea"/>
-              <a:cs typeface="+mn-cs"/>
-            </a:defRPr>
-          </a:pPr>
-          <a:endParaRPr lang="en-US"/>
-        </a:p>
-      </c:txPr>
-    </c:legend>
-    <c:plotVisOnly val="1"/>
-    <c:dispBlanksAs val="gap"/>
-    <c:showDLblsOverMax val="0"/>
-    <c:extLst/>
-  </c:chart>
-  <c:txPr>
-    <a:bodyPr/>
-    <a:lstStyle/>
-    <a:p>
-      <a:pPr>
-        <a:defRPr/>
-      </a:pPr>
-      <a:endParaRPr lang="en-US"/>
-    </a:p>
-  </c:txPr>
-  <c:externalData r:id="rId1">
-    <c:autoUpdate val="0"/>
-  </c:externalData>
-</c:chartSpace>
-</file>
-
-<file path=ppt/charts/chart17.xml><?xml version="1.0" encoding="utf-8"?>
-<c:chartSpace xmlns:c="http://schemas.openxmlformats.org/drawingml/2006/chart" xmlns:a="http://schemas.openxmlformats.org/drawingml/2006/main" xmlns:r="http://schemas.openxmlformats.org/officeDocument/2006/relationships" xmlns:c16r2="http://schemas.microsoft.com/office/drawing/2015/06/chart">
-  <c:date1904 val="0"/>
-  <c:lang val="en-GB"/>
-  <c:roundedCorners val="0"/>
-  <mc:AlternateContent xmlns:mc="http://schemas.openxmlformats.org/markup-compatibility/2006">
-    <mc:Choice xmlns:c14="http://schemas.microsoft.com/office/drawing/2007/8/2/chart" Requires="c14">
-      <c14:style val="102"/>
-    </mc:Choice>
-    <mc:Fallback>
-      <c:style val="2"/>
-    </mc:Fallback>
-  </mc:AlternateContent>
-  <c:chart>
-    <c:title>
-      <c:tx>
-        <c:rich>
-          <a:bodyPr rot="0" spcFirstLastPara="1" vertOverflow="ellipsis" vert="horz" wrap="square" anchor="ctr" anchorCtr="1"/>
-          <a:lstStyle/>
-          <a:p>
-            <a:pPr>
-              <a:defRPr sz="1400" b="0" i="0" u="none" strike="noStrike" kern="1200" spc="0" baseline="0">
-                <a:solidFill>
-                  <a:schemeClr val="tx1">
-                    <a:lumMod val="65000"/>
-                    <a:lumOff val="35000"/>
-                  </a:schemeClr>
-                </a:solidFill>
-                <a:latin typeface="+mn-lt"/>
-                <a:ea typeface="+mn-ea"/>
-                <a:cs typeface="+mn-cs"/>
-              </a:defRPr>
-            </a:pPr>
-            <a:r>
-              <a:rPr lang="en-AU" dirty="0"/>
-              <a:t>Volve PNA Composition</a:t>
-            </a:r>
-          </a:p>
-        </c:rich>
-      </c:tx>
-      <c:overlay val="0"/>
-      <c:spPr>
-        <a:noFill/>
-        <a:ln>
-          <a:noFill/>
-        </a:ln>
-        <a:effectLst/>
-      </c:spPr>
-    </c:title>
-    <c:autoTitleDeleted val="0"/>
-    <c:plotArea>
-      <c:layout/>
-      <c:scatterChart>
-        <c:scatterStyle val="lineMarker"/>
-        <c:varyColors val="0"/>
-        <c:ser>
-          <c:idx val="1"/>
-          <c:order val="0"/>
-          <c:tx>
-            <c:v>Paraffins</c:v>
-          </c:tx>
-          <c:spPr>
-            <a:ln w="31750" cap="rnd">
-              <a:solidFill>
-                <a:srgbClr val="C00000"/>
-              </a:solidFill>
-              <a:round/>
-            </a:ln>
-            <a:effectLst/>
-          </c:spPr>
-          <c:marker>
-            <c:symbol val="circle"/>
-            <c:size val="5"/>
-            <c:spPr>
-              <a:solidFill>
-                <a:srgbClr val="FF9999"/>
-              </a:solidFill>
-              <a:ln w="12700">
-                <a:solidFill>
-                  <a:srgbClr val="C00000"/>
-                </a:solidFill>
-              </a:ln>
-              <a:effectLst/>
-            </c:spPr>
-          </c:marker>
-          <c:xVal>
-            <c:numRef>
-              <c:f>PyrusData!$K$8:$K$22</c:f>
-              <c:numCache>
-                <c:formatCode>General</c:formatCode>
-                <c:ptCount val="15"/>
-                <c:pt idx="0">
-                  <c:v>6</c:v>
-                </c:pt>
-                <c:pt idx="1">
-                  <c:v>7</c:v>
-                </c:pt>
-                <c:pt idx="2">
-                  <c:v>8</c:v>
-                </c:pt>
-                <c:pt idx="3">
-                  <c:v>9</c:v>
-                </c:pt>
-                <c:pt idx="4">
-                  <c:v>10</c:v>
-                </c:pt>
-                <c:pt idx="5">
-                  <c:v>11</c:v>
-                </c:pt>
-                <c:pt idx="6">
-                  <c:v>12</c:v>
-                </c:pt>
-                <c:pt idx="7">
-                  <c:v>13</c:v>
-                </c:pt>
-                <c:pt idx="8">
-                  <c:v>14</c:v>
-                </c:pt>
-                <c:pt idx="9">
-                  <c:v>15</c:v>
-                </c:pt>
-                <c:pt idx="10">
-                  <c:v>16</c:v>
-                </c:pt>
-                <c:pt idx="11">
-                  <c:v>17</c:v>
-                </c:pt>
-                <c:pt idx="12">
-                  <c:v>18</c:v>
-                </c:pt>
-                <c:pt idx="13">
-                  <c:v>19</c:v>
-                </c:pt>
-                <c:pt idx="14">
-                  <c:v>20</c:v>
-                </c:pt>
-              </c:numCache>
-            </c:numRef>
-          </c:xVal>
-          <c:yVal>
-            <c:numRef>
-              <c:f>PyrusData!$S$8:$S$22</c:f>
-              <c:numCache>
-                <c:formatCode>General</c:formatCode>
-                <c:ptCount val="15"/>
-                <c:pt idx="0">
-                  <c:v>0.95399999999999996</c:v>
-                </c:pt>
-                <c:pt idx="1">
-                  <c:v>0.71</c:v>
-                </c:pt>
-                <c:pt idx="2">
-                  <c:v>0.64300000000000002</c:v>
-                </c:pt>
-                <c:pt idx="3">
-                  <c:v>0.58399999999999996</c:v>
-                </c:pt>
-                <c:pt idx="4">
-                  <c:v>0.53100000000000003</c:v>
-                </c:pt>
-                <c:pt idx="5">
-                  <c:v>0.52400000000000002</c:v>
-                </c:pt>
-                <c:pt idx="6">
-                  <c:v>0.47299999999999998</c:v>
-                </c:pt>
-                <c:pt idx="7">
-                  <c:v>0.441</c:v>
-                </c:pt>
-                <c:pt idx="8">
-                  <c:v>0.41299999999999998</c:v>
-                </c:pt>
-                <c:pt idx="9">
-                  <c:v>0.40200000000000002</c:v>
-                </c:pt>
-                <c:pt idx="10">
-                  <c:v>0.38800000000000001</c:v>
-                </c:pt>
-                <c:pt idx="11">
-                  <c:v>0.41399999999999998</c:v>
-                </c:pt>
-                <c:pt idx="12" formatCode="0.00E+00">
-                  <c:v>0.39600000000000002</c:v>
-                </c:pt>
-                <c:pt idx="13">
-                  <c:v>0.38700000000000001</c:v>
-                </c:pt>
-                <c:pt idx="14" formatCode="0.00E+00">
-                  <c:v>0.152</c:v>
-                </c:pt>
-              </c:numCache>
-            </c:numRef>
-          </c:yVal>
-          <c:smooth val="0"/>
-          <c:extLst>
-            <c:ext xmlns:c16="http://schemas.microsoft.com/office/drawing/2014/chart" uri="{C3380CC4-5D6E-409C-BE32-E72D297353CC}">
-              <c16:uniqueId val="{00000000-CBA1-4A4F-A8EB-5D8152E316DA}"/>
-            </c:ext>
-          </c:extLst>
-        </c:ser>
-        <c:ser>
-          <c:idx val="0"/>
-          <c:order val="1"/>
-          <c:tx>
-            <c:v>Naphthenes</c:v>
-          </c:tx>
-          <c:spPr>
-            <a:ln w="31750" cap="rnd">
-              <a:solidFill>
-                <a:srgbClr val="FF9900"/>
-              </a:solidFill>
-              <a:round/>
-            </a:ln>
-            <a:effectLst/>
-          </c:spPr>
-          <c:marker>
-            <c:symbol val="circle"/>
-            <c:size val="5"/>
-            <c:spPr>
-              <a:solidFill>
-                <a:srgbClr val="FFCC66"/>
-              </a:solidFill>
-              <a:ln w="12700">
-                <a:solidFill>
-                  <a:srgbClr val="FF9900"/>
-                </a:solidFill>
-              </a:ln>
-              <a:effectLst/>
-            </c:spPr>
-          </c:marker>
-          <c:xVal>
-            <c:numRef>
-              <c:f>PyrusData!$K$8:$K$22</c:f>
-              <c:numCache>
-                <c:formatCode>General</c:formatCode>
-                <c:ptCount val="15"/>
-                <c:pt idx="0">
-                  <c:v>6</c:v>
-                </c:pt>
-                <c:pt idx="1">
-                  <c:v>7</c:v>
-                </c:pt>
-                <c:pt idx="2">
-                  <c:v>8</c:v>
-                </c:pt>
-                <c:pt idx="3">
-                  <c:v>9</c:v>
-                </c:pt>
-                <c:pt idx="4">
-                  <c:v>10</c:v>
-                </c:pt>
-                <c:pt idx="5">
-                  <c:v>11</c:v>
-                </c:pt>
-                <c:pt idx="6">
-                  <c:v>12</c:v>
-                </c:pt>
-                <c:pt idx="7">
-                  <c:v>13</c:v>
-                </c:pt>
-                <c:pt idx="8">
-                  <c:v>14</c:v>
-                </c:pt>
-                <c:pt idx="9">
-                  <c:v>15</c:v>
-                </c:pt>
-                <c:pt idx="10">
-                  <c:v>16</c:v>
-                </c:pt>
-                <c:pt idx="11">
-                  <c:v>17</c:v>
-                </c:pt>
-                <c:pt idx="12">
-                  <c:v>18</c:v>
-                </c:pt>
-                <c:pt idx="13">
-                  <c:v>19</c:v>
-                </c:pt>
-                <c:pt idx="14">
-                  <c:v>20</c:v>
-                </c:pt>
-              </c:numCache>
-            </c:numRef>
-          </c:xVal>
-          <c:yVal>
-            <c:numRef>
-              <c:f>PyrusData!$T$8:$T$22</c:f>
-              <c:numCache>
-                <c:formatCode>0.00E+00</c:formatCode>
-                <c:ptCount val="15"/>
-                <c:pt idx="0">
-                  <c:v>1.6000000000000001E-3</c:v>
-                </c:pt>
-                <c:pt idx="1">
-                  <c:v>0.17199999999999999</c:v>
-                </c:pt>
-                <c:pt idx="2" formatCode="General">
-                  <c:v>0.20399999999999999</c:v>
-                </c:pt>
-                <c:pt idx="3" formatCode="General">
-                  <c:v>0.22800000000000001</c:v>
-                </c:pt>
-                <c:pt idx="4" formatCode="General">
-                  <c:v>0.245</c:v>
-                </c:pt>
-                <c:pt idx="5" formatCode="General">
-                  <c:v>0.253</c:v>
-                </c:pt>
-                <c:pt idx="6" formatCode="General">
-                  <c:v>0.26300000000000001</c:v>
-                </c:pt>
-                <c:pt idx="7" formatCode="General">
-                  <c:v>0.26900000000000002</c:v>
-                </c:pt>
-                <c:pt idx="8" formatCode="General">
-                  <c:v>0.27100000000000002</c:v>
-                </c:pt>
-                <c:pt idx="9" formatCode="General">
-                  <c:v>0.26100000000000001</c:v>
-                </c:pt>
-                <c:pt idx="10" formatCode="General">
-                  <c:v>0.247</c:v>
-                </c:pt>
-                <c:pt idx="11" formatCode="General">
-                  <c:v>0.23100000000000001</c:v>
-                </c:pt>
-                <c:pt idx="12" formatCode="General">
-                  <c:v>0.27300000000000002</c:v>
-                </c:pt>
-                <c:pt idx="13" formatCode="General">
-                  <c:v>0.253</c:v>
-                </c:pt>
-                <c:pt idx="14" formatCode="General">
-                  <c:v>0.13900000000000001</c:v>
-                </c:pt>
-              </c:numCache>
-            </c:numRef>
-          </c:yVal>
-          <c:smooth val="0"/>
-          <c:extLst>
-            <c:ext xmlns:c16="http://schemas.microsoft.com/office/drawing/2014/chart" uri="{C3380CC4-5D6E-409C-BE32-E72D297353CC}">
-              <c16:uniqueId val="{00000001-CBA1-4A4F-A8EB-5D8152E316DA}"/>
-            </c:ext>
-          </c:extLst>
-        </c:ser>
-        <c:ser>
-          <c:idx val="3"/>
-          <c:order val="2"/>
-          <c:tx>
-            <c:v>Aromatics</c:v>
-          </c:tx>
-          <c:spPr>
-            <a:ln w="31750">
-              <a:solidFill>
-                <a:srgbClr val="006600"/>
-              </a:solidFill>
-            </a:ln>
-          </c:spPr>
-          <c:marker>
-            <c:symbol val="circle"/>
-            <c:size val="5"/>
-            <c:spPr>
-              <a:solidFill>
-                <a:srgbClr val="99FF66"/>
-              </a:solidFill>
-              <a:ln w="12700">
-                <a:solidFill>
-                  <a:srgbClr val="006600"/>
-                </a:solidFill>
-              </a:ln>
-            </c:spPr>
-          </c:marker>
-          <c:xVal>
-            <c:numRef>
-              <c:f>PyrusData!$K$8:$K$22</c:f>
-              <c:numCache>
-                <c:formatCode>General</c:formatCode>
-                <c:ptCount val="15"/>
-                <c:pt idx="0">
-                  <c:v>6</c:v>
-                </c:pt>
-                <c:pt idx="1">
-                  <c:v>7</c:v>
-                </c:pt>
-                <c:pt idx="2">
-                  <c:v>8</c:v>
-                </c:pt>
-                <c:pt idx="3">
-                  <c:v>9</c:v>
-                </c:pt>
-                <c:pt idx="4">
-                  <c:v>10</c:v>
-                </c:pt>
-                <c:pt idx="5">
-                  <c:v>11</c:v>
-                </c:pt>
-                <c:pt idx="6">
-                  <c:v>12</c:v>
-                </c:pt>
-                <c:pt idx="7">
-                  <c:v>13</c:v>
-                </c:pt>
-                <c:pt idx="8">
-                  <c:v>14</c:v>
-                </c:pt>
-                <c:pt idx="9">
-                  <c:v>15</c:v>
-                </c:pt>
-                <c:pt idx="10">
-                  <c:v>16</c:v>
-                </c:pt>
-                <c:pt idx="11">
-                  <c:v>17</c:v>
-                </c:pt>
-                <c:pt idx="12">
-                  <c:v>18</c:v>
-                </c:pt>
-                <c:pt idx="13">
-                  <c:v>19</c:v>
-                </c:pt>
-                <c:pt idx="14">
-                  <c:v>20</c:v>
-                </c:pt>
-              </c:numCache>
-            </c:numRef>
-          </c:xVal>
-          <c:yVal>
-            <c:numRef>
-              <c:f>PyrusData!$U$8:$U$22</c:f>
-              <c:numCache>
-                <c:formatCode>0.00E+00</c:formatCode>
-                <c:ptCount val="15"/>
-                <c:pt idx="0">
-                  <c:v>4.4299999999999999E-2</c:v>
-                </c:pt>
-                <c:pt idx="1">
-                  <c:v>0.11799999999999999</c:v>
-                </c:pt>
-                <c:pt idx="2">
-                  <c:v>0.153</c:v>
-                </c:pt>
-                <c:pt idx="3" formatCode="General">
-                  <c:v>0.188</c:v>
-                </c:pt>
-                <c:pt idx="4" formatCode="General">
-                  <c:v>0.224</c:v>
-                </c:pt>
-                <c:pt idx="5" formatCode="General">
-                  <c:v>0.223</c:v>
-                </c:pt>
-                <c:pt idx="6" formatCode="General">
-                  <c:v>0.26400000000000001</c:v>
-                </c:pt>
-                <c:pt idx="7" formatCode="General">
-                  <c:v>0.29099999999999998</c:v>
-                </c:pt>
-                <c:pt idx="8" formatCode="General">
-                  <c:v>0.316</c:v>
-                </c:pt>
-                <c:pt idx="9" formatCode="General">
-                  <c:v>0.33700000000000002</c:v>
-                </c:pt>
-                <c:pt idx="10" formatCode="General">
-                  <c:v>0.36399999999999999</c:v>
-                </c:pt>
-                <c:pt idx="11" formatCode="General">
-                  <c:v>0.35599999999999998</c:v>
-                </c:pt>
-                <c:pt idx="12" formatCode="General">
-                  <c:v>0.33100000000000002</c:v>
-                </c:pt>
-                <c:pt idx="13" formatCode="General">
-                  <c:v>0.36099999999999999</c:v>
-                </c:pt>
-                <c:pt idx="14" formatCode="General">
-                  <c:v>0.70899999999999996</c:v>
-                </c:pt>
-              </c:numCache>
-            </c:numRef>
-          </c:yVal>
-          <c:smooth val="0"/>
-          <c:extLst>
-            <c:ext xmlns:c16="http://schemas.microsoft.com/office/drawing/2014/chart" uri="{C3380CC4-5D6E-409C-BE32-E72D297353CC}">
-              <c16:uniqueId val="{00000002-CBA1-4A4F-A8EB-5D8152E316DA}"/>
-            </c:ext>
-          </c:extLst>
-        </c:ser>
-        <c:ser>
-          <c:idx val="2"/>
-          <c:order val="3"/>
-          <c:tx>
-            <c:v>Measured A%</c:v>
-          </c:tx>
-          <c:spPr>
-            <a:ln w="12700">
-              <a:solidFill>
-                <a:schemeClr val="tx1"/>
-              </a:solidFill>
-            </a:ln>
-          </c:spPr>
-          <c:marker>
-            <c:symbol val="circle"/>
-            <c:size val="5"/>
-            <c:spPr>
-              <a:ln>
-                <a:solidFill>
-                  <a:schemeClr val="tx1"/>
-                </a:solidFill>
-              </a:ln>
-            </c:spPr>
-          </c:marker>
-          <c:xVal>
-            <c:numRef>
-              <c:f>PyrusData!$K$8:$K$22</c:f>
-              <c:numCache>
-                <c:formatCode>General</c:formatCode>
-                <c:ptCount val="15"/>
-                <c:pt idx="0">
-                  <c:v>6</c:v>
-                </c:pt>
-                <c:pt idx="1">
-                  <c:v>7</c:v>
-                </c:pt>
-                <c:pt idx="2">
-                  <c:v>8</c:v>
-                </c:pt>
-                <c:pt idx="3">
-                  <c:v>9</c:v>
-                </c:pt>
-                <c:pt idx="4">
-                  <c:v>10</c:v>
-                </c:pt>
-                <c:pt idx="5">
-                  <c:v>11</c:v>
-                </c:pt>
-                <c:pt idx="6">
-                  <c:v>12</c:v>
-                </c:pt>
-                <c:pt idx="7">
-                  <c:v>13</c:v>
-                </c:pt>
-                <c:pt idx="8">
-                  <c:v>14</c:v>
-                </c:pt>
-                <c:pt idx="9">
-                  <c:v>15</c:v>
-                </c:pt>
-                <c:pt idx="10">
-                  <c:v>16</c:v>
-                </c:pt>
-                <c:pt idx="11">
-                  <c:v>17</c:v>
-                </c:pt>
-                <c:pt idx="12">
-                  <c:v>18</c:v>
-                </c:pt>
-                <c:pt idx="13">
-                  <c:v>19</c:v>
-                </c:pt>
-                <c:pt idx="14">
-                  <c:v>20</c:v>
-                </c:pt>
-              </c:numCache>
-            </c:numRef>
-          </c:xVal>
-          <c:yVal>
-            <c:numRef>
-              <c:f>PyrusData!$V$8:$V$22</c:f>
-              <c:numCache>
-                <c:formatCode>General</c:formatCode>
-                <c:ptCount val="15"/>
-                <c:pt idx="0">
-                  <c:v>0</c:v>
-                </c:pt>
-                <c:pt idx="1">
-                  <c:v>0.14499999999999999</c:v>
-                </c:pt>
-                <c:pt idx="2">
-                  <c:v>0.19500000000000001</c:v>
-                </c:pt>
-                <c:pt idx="3">
-                  <c:v>0.27399999999999997</c:v>
-                </c:pt>
-                <c:pt idx="4">
-                  <c:v>0.27200000000000002</c:v>
-                </c:pt>
-                <c:pt idx="5">
-                  <c:v>0.248</c:v>
-                </c:pt>
-                <c:pt idx="6">
-                  <c:v>0.253</c:v>
-                </c:pt>
-                <c:pt idx="7">
-                  <c:v>0.251</c:v>
-                </c:pt>
-                <c:pt idx="8">
-                  <c:v>0.25800000000000001</c:v>
-                </c:pt>
-                <c:pt idx="9">
-                  <c:v>0.309</c:v>
-                </c:pt>
-                <c:pt idx="10">
-                  <c:v>0.34499999999999997</c:v>
-                </c:pt>
-                <c:pt idx="11">
-                  <c:v>0.34700000000000003</c:v>
-                </c:pt>
-                <c:pt idx="12">
-                  <c:v>0.34299999999999997</c:v>
-                </c:pt>
-                <c:pt idx="13">
-                  <c:v>0.36700000000000005</c:v>
-                </c:pt>
-                <c:pt idx="14">
-                  <c:v>0.63400000000000001</c:v>
-                </c:pt>
-              </c:numCache>
-            </c:numRef>
-          </c:yVal>
-          <c:smooth val="0"/>
-          <c:extLst>
-            <c:ext xmlns:c16="http://schemas.microsoft.com/office/drawing/2014/chart" uri="{C3380CC4-5D6E-409C-BE32-E72D297353CC}">
-              <c16:uniqueId val="{00000003-CBA1-4A4F-A8EB-5D8152E316DA}"/>
-            </c:ext>
-          </c:extLst>
-        </c:ser>
-        <c:dLbls>
-          <c:showLegendKey val="0"/>
-          <c:showVal val="0"/>
-          <c:showCatName val="0"/>
-          <c:showSerName val="0"/>
-          <c:showPercent val="0"/>
-          <c:showBubbleSize val="0"/>
-        </c:dLbls>
-        <c:axId val="1205457728"/>
-        <c:axId val="1205456288"/>
-      </c:scatterChart>
-      <c:valAx>
-        <c:axId val="1205457728"/>
-        <c:scaling>
-          <c:orientation val="minMax"/>
-          <c:max val="20"/>
-          <c:min val="6"/>
-        </c:scaling>
-        <c:delete val="0"/>
-        <c:axPos val="b"/>
-        <c:majorGridlines>
-          <c:spPr>
-            <a:ln w="9525" cap="flat" cmpd="sng" algn="ctr">
-              <a:solidFill>
-                <a:schemeClr val="tx1">
-                  <a:lumMod val="15000"/>
-                  <a:lumOff val="85000"/>
-                </a:schemeClr>
-              </a:solidFill>
-              <a:round/>
-            </a:ln>
-            <a:effectLst/>
-          </c:spPr>
-        </c:majorGridlines>
-        <c:title>
-          <c:tx>
-            <c:rich>
-              <a:bodyPr rot="0" spcFirstLastPara="1" vertOverflow="ellipsis" vert="horz" wrap="square" anchor="ctr" anchorCtr="1"/>
-              <a:lstStyle/>
-              <a:p>
-                <a:pPr>
-                  <a:defRPr sz="1000" b="1" i="0" u="none" strike="noStrike" kern="1200" baseline="0">
-                    <a:solidFill>
-                      <a:schemeClr val="tx1">
-                        <a:lumMod val="65000"/>
-                        <a:lumOff val="35000"/>
-                      </a:schemeClr>
-                    </a:solidFill>
-                    <a:latin typeface="+mn-lt"/>
-                    <a:ea typeface="+mn-ea"/>
-                    <a:cs typeface="+mn-cs"/>
-                  </a:defRPr>
-                </a:pPr>
-                <a:r>
-                  <a:rPr lang="en-AU" b="1"/>
-                  <a:t>Volve</a:t>
-                </a:r>
-                <a:r>
-                  <a:rPr lang="en-AU" b="1" baseline="0"/>
-                  <a:t> SCN Fraction</a:t>
-                </a:r>
-                <a:endParaRPr lang="en-AU" b="1"/>
-              </a:p>
-            </c:rich>
-          </c:tx>
-          <c:layout>
-            <c:manualLayout>
-              <c:xMode val="edge"/>
-              <c:yMode val="edge"/>
-              <c:x val="0.33970652777777777"/>
-              <c:y val="0.92884166666666679"/>
-            </c:manualLayout>
-          </c:layout>
-          <c:overlay val="0"/>
-          <c:spPr>
-            <a:noFill/>
-            <a:ln>
-              <a:noFill/>
-            </a:ln>
-            <a:effectLst/>
-          </c:spPr>
-        </c:title>
-        <c:numFmt formatCode="General" sourceLinked="1"/>
-        <c:majorTickMark val="none"/>
-        <c:minorTickMark val="none"/>
-        <c:tickLblPos val="nextTo"/>
-        <c:spPr>
-          <a:noFill/>
-          <a:ln w="9525" cap="flat" cmpd="sng" algn="ctr">
-            <a:solidFill>
-              <a:schemeClr val="tx1">
-                <a:lumMod val="25000"/>
-                <a:lumOff val="75000"/>
-              </a:schemeClr>
-            </a:solidFill>
-            <a:round/>
-          </a:ln>
-          <a:effectLst/>
-        </c:spPr>
-        <c:txPr>
-          <a:bodyPr rot="-60000000" spcFirstLastPara="1" vertOverflow="ellipsis" vert="horz" wrap="square" anchor="ctr" anchorCtr="1"/>
-          <a:lstStyle/>
-          <a:p>
-            <a:pPr>
-              <a:defRPr sz="900" b="0" i="0" u="none" strike="noStrike" kern="1200" baseline="0">
-                <a:solidFill>
-                  <a:schemeClr val="tx1">
-                    <a:lumMod val="65000"/>
-                    <a:lumOff val="35000"/>
-                  </a:schemeClr>
-                </a:solidFill>
-                <a:latin typeface="+mn-lt"/>
-                <a:ea typeface="+mn-ea"/>
-                <a:cs typeface="+mn-cs"/>
-              </a:defRPr>
-            </a:pPr>
-            <a:endParaRPr lang="en-US"/>
-          </a:p>
-        </c:txPr>
-        <c:crossAx val="1205456288"/>
-        <c:crosses val="autoZero"/>
-        <c:crossBetween val="midCat"/>
-      </c:valAx>
-      <c:valAx>
-        <c:axId val="1205456288"/>
-        <c:scaling>
-          <c:orientation val="minMax"/>
-          <c:max val="1"/>
-        </c:scaling>
-        <c:delete val="0"/>
-        <c:axPos val="l"/>
-        <c:majorGridlines>
-          <c:spPr>
-            <a:ln w="9525" cap="flat" cmpd="sng" algn="ctr">
-              <a:solidFill>
-                <a:schemeClr val="tx1">
-                  <a:lumMod val="15000"/>
-                  <a:lumOff val="85000"/>
-                </a:schemeClr>
-              </a:solidFill>
-              <a:round/>
-            </a:ln>
-            <a:effectLst/>
-          </c:spPr>
-        </c:majorGridlines>
-        <c:title>
-          <c:tx>
-            <c:rich>
-              <a:bodyPr rot="-5400000" spcFirstLastPara="1" vertOverflow="ellipsis" vert="horz" wrap="square" anchor="ctr" anchorCtr="1"/>
-              <a:lstStyle/>
-              <a:p>
-                <a:pPr>
-                  <a:defRPr sz="1000" b="1" i="0" u="none" strike="noStrike" kern="1200" baseline="0">
-                    <a:solidFill>
-                      <a:schemeClr val="tx1">
-                        <a:lumMod val="65000"/>
-                        <a:lumOff val="35000"/>
-                      </a:schemeClr>
-                    </a:solidFill>
-                    <a:latin typeface="+mn-lt"/>
-                    <a:ea typeface="+mn-ea"/>
-                    <a:cs typeface="+mn-cs"/>
-                  </a:defRPr>
-                </a:pPr>
-                <a:r>
-                  <a:rPr lang="en-AU" b="1"/>
-                  <a:t>Percentage</a:t>
-                </a:r>
-                <a:r>
-                  <a:rPr lang="en-AU" b="1" baseline="0"/>
-                  <a:t> Found in Pseudo-component</a:t>
-                </a:r>
-                <a:endParaRPr lang="en-AU" b="1"/>
-              </a:p>
-            </c:rich>
-          </c:tx>
-          <c:layout>
-            <c:manualLayout>
-              <c:xMode val="edge"/>
-              <c:yMode val="edge"/>
-              <c:x val="1.4111035589686733E-2"/>
-              <c:y val="0.14109642651423862"/>
             </c:manualLayout>
           </c:layout>
           <c:overlay val="0"/>
@@ -19277,10 +19280,7 @@
                 <a:pPr>
                   <a:defRPr sz="1000" b="0" i="0" u="none" strike="noStrike" kern="1200" baseline="0">
                     <a:solidFill>
-                      <a:schemeClr val="tx1">
-                        <a:lumMod val="65000"/>
-                        <a:lumOff val="35000"/>
-                      </a:schemeClr>
+                      <a:srgbClr val="C00000"/>
                     </a:solidFill>
                     <a:latin typeface="+mn-lt"/>
                     <a:ea typeface="+mn-ea"/>
@@ -19288,7 +19288,11 @@
                   </a:defRPr>
                 </a:pPr>
                 <a:r>
-                  <a:rPr lang="en-AU"/>
+                  <a:rPr lang="en-AU">
+                    <a:solidFill>
+                      <a:srgbClr val="C00000"/>
+                    </a:solidFill>
+                  </a:rPr>
                   <a:t>SG</a:t>
                 </a:r>
               </a:p>
@@ -19309,10 +19313,7 @@
               <a:pPr>
                 <a:defRPr sz="1000" b="0" i="0" u="none" strike="noStrike" kern="1200" baseline="0">
                   <a:solidFill>
-                    <a:schemeClr val="tx1">
-                      <a:lumMod val="65000"/>
-                      <a:lumOff val="35000"/>
-                    </a:schemeClr>
+                    <a:srgbClr val="C00000"/>
                   </a:solidFill>
                   <a:latin typeface="+mn-lt"/>
                   <a:ea typeface="+mn-ea"/>
@@ -19347,10 +19348,7 @@
             <a:pPr>
               <a:defRPr sz="900" b="0" i="0" u="none" strike="noStrike" kern="1200" baseline="0">
                 <a:solidFill>
-                  <a:schemeClr val="tx1">
-                    <a:lumMod val="65000"/>
-                    <a:lumOff val="35000"/>
-                  </a:schemeClr>
+                  <a:srgbClr val="C00000"/>
                 </a:solidFill>
                 <a:latin typeface="+mn-lt"/>
                 <a:ea typeface="+mn-ea"/>
@@ -21062,10 +21060,7 @@
                 <a:pPr>
                   <a:defRPr sz="1000" b="0" i="0" u="none" strike="noStrike" kern="1200" baseline="0">
                     <a:solidFill>
-                      <a:schemeClr val="tx1">
-                        <a:lumMod val="65000"/>
-                        <a:lumOff val="35000"/>
-                      </a:schemeClr>
+                      <a:srgbClr val="FF6600"/>
                     </a:solidFill>
                     <a:latin typeface="+mn-lt"/>
                     <a:ea typeface="+mn-ea"/>
@@ -21073,7 +21068,11 @@
                   </a:defRPr>
                 </a:pPr>
                 <a:r>
-                  <a:rPr lang="en-AU"/>
+                  <a:rPr lang="en-AU">
+                    <a:solidFill>
+                      <a:srgbClr val="FF6600"/>
+                    </a:solidFill>
+                  </a:rPr>
                   <a:t>SG</a:t>
                 </a:r>
               </a:p>
@@ -21094,10 +21093,7 @@
               <a:pPr>
                 <a:defRPr sz="1000" b="0" i="0" u="none" strike="noStrike" kern="1200" baseline="0">
                   <a:solidFill>
-                    <a:schemeClr val="tx1">
-                      <a:lumMod val="65000"/>
-                      <a:lumOff val="35000"/>
-                    </a:schemeClr>
+                    <a:srgbClr val="FF6600"/>
                   </a:solidFill>
                   <a:latin typeface="+mn-lt"/>
                   <a:ea typeface="+mn-ea"/>
@@ -21132,10 +21128,7 @@
             <a:pPr>
               <a:defRPr sz="900" b="0" i="0" u="none" strike="noStrike" kern="1200" baseline="0">
                 <a:solidFill>
-                  <a:schemeClr val="tx1">
-                    <a:lumMod val="65000"/>
-                    <a:lumOff val="35000"/>
-                  </a:schemeClr>
+                  <a:srgbClr val="FF6600"/>
                 </a:solidFill>
                 <a:latin typeface="+mn-lt"/>
                 <a:ea typeface="+mn-ea"/>
@@ -23257,10 +23250,7 @@
                 <a:pPr>
                   <a:defRPr sz="1000" b="0" i="0" u="none" strike="noStrike" kern="1200" baseline="0">
                     <a:solidFill>
-                      <a:schemeClr val="tx1">
-                        <a:lumMod val="65000"/>
-                        <a:lumOff val="35000"/>
-                      </a:schemeClr>
+                      <a:srgbClr val="006600"/>
                     </a:solidFill>
                     <a:latin typeface="+mn-lt"/>
                     <a:ea typeface="+mn-ea"/>
@@ -23268,7 +23258,11 @@
                   </a:defRPr>
                 </a:pPr>
                 <a:r>
-                  <a:rPr lang="en-AU"/>
+                  <a:rPr lang="en-AU">
+                    <a:solidFill>
+                      <a:srgbClr val="006600"/>
+                    </a:solidFill>
+                  </a:rPr>
                   <a:t>SG</a:t>
                 </a:r>
               </a:p>
@@ -23289,10 +23283,7 @@
               <a:pPr>
                 <a:defRPr sz="1000" b="0" i="0" u="none" strike="noStrike" kern="1200" baseline="0">
                   <a:solidFill>
-                    <a:schemeClr val="tx1">
-                      <a:lumMod val="65000"/>
-                      <a:lumOff val="35000"/>
-                    </a:schemeClr>
+                    <a:srgbClr val="006600"/>
                   </a:solidFill>
                   <a:latin typeface="+mn-lt"/>
                   <a:ea typeface="+mn-ea"/>
@@ -23327,10 +23318,7 @@
             <a:pPr>
               <a:defRPr sz="900" b="0" i="0" u="none" strike="noStrike" kern="1200" baseline="0">
                 <a:solidFill>
-                  <a:schemeClr val="tx1">
-                    <a:lumMod val="65000"/>
-                    <a:lumOff val="35000"/>
-                  </a:schemeClr>
+                  <a:srgbClr val="006600"/>
                 </a:solidFill>
                 <a:latin typeface="+mn-lt"/>
                 <a:ea typeface="+mn-ea"/>
@@ -32758,7 +32746,7 @@
           <a:p>
             <a:fld id="{6EA6E902-5EF2-483D-936E-8D99D2FEC797}" type="datetimeFigureOut">
               <a:rPr lang="en-AU" smtClean="0"/>
-              <a:t>29/11/2024</a:t>
+              <a:t>1/12/2024</a:t>
             </a:fld>
             <a:endParaRPr lang="en-AU"/>
           </a:p>
@@ -33259,7 +33247,7 @@
           <a:p>
             <a:fld id="{763871C2-E1E2-4868-9E66-FEFE29AC3DBE}" type="datetimeFigureOut">
               <a:rPr lang="en-AU" smtClean="0"/>
-              <a:t>29/11/2024</a:t>
+              <a:t>1/12/2024</a:t>
             </a:fld>
             <a:endParaRPr lang="en-AU"/>
           </a:p>
@@ -33459,7 +33447,7 @@
           <a:p>
             <a:fld id="{763871C2-E1E2-4868-9E66-FEFE29AC3DBE}" type="datetimeFigureOut">
               <a:rPr lang="en-AU" smtClean="0"/>
-              <a:t>29/11/2024</a:t>
+              <a:t>1/12/2024</a:t>
             </a:fld>
             <a:endParaRPr lang="en-AU"/>
           </a:p>
@@ -33669,7 +33657,7 @@
           <a:p>
             <a:fld id="{763871C2-E1E2-4868-9E66-FEFE29AC3DBE}" type="datetimeFigureOut">
               <a:rPr lang="en-AU" smtClean="0"/>
-              <a:t>29/11/2024</a:t>
+              <a:t>1/12/2024</a:t>
             </a:fld>
             <a:endParaRPr lang="en-AU"/>
           </a:p>
@@ -33869,7 +33857,7 @@
           <a:p>
             <a:fld id="{763871C2-E1E2-4868-9E66-FEFE29AC3DBE}" type="datetimeFigureOut">
               <a:rPr lang="en-AU" smtClean="0"/>
-              <a:t>29/11/2024</a:t>
+              <a:t>1/12/2024</a:t>
             </a:fld>
             <a:endParaRPr lang="en-AU"/>
           </a:p>
@@ -34145,7 +34133,7 @@
           <a:p>
             <a:fld id="{763871C2-E1E2-4868-9E66-FEFE29AC3DBE}" type="datetimeFigureOut">
               <a:rPr lang="en-AU" smtClean="0"/>
-              <a:t>29/11/2024</a:t>
+              <a:t>1/12/2024</a:t>
             </a:fld>
             <a:endParaRPr lang="en-AU"/>
           </a:p>
@@ -34413,7 +34401,7 @@
           <a:p>
             <a:fld id="{763871C2-E1E2-4868-9E66-FEFE29AC3DBE}" type="datetimeFigureOut">
               <a:rPr lang="en-AU" smtClean="0"/>
-              <a:t>29/11/2024</a:t>
+              <a:t>1/12/2024</a:t>
             </a:fld>
             <a:endParaRPr lang="en-AU"/>
           </a:p>
@@ -34828,7 +34816,7 @@
           <a:p>
             <a:fld id="{763871C2-E1E2-4868-9E66-FEFE29AC3DBE}" type="datetimeFigureOut">
               <a:rPr lang="en-AU" smtClean="0"/>
-              <a:t>29/11/2024</a:t>
+              <a:t>1/12/2024</a:t>
             </a:fld>
             <a:endParaRPr lang="en-AU"/>
           </a:p>
@@ -34970,7 +34958,7 @@
           <a:p>
             <a:fld id="{763871C2-E1E2-4868-9E66-FEFE29AC3DBE}" type="datetimeFigureOut">
               <a:rPr lang="en-AU" smtClean="0"/>
-              <a:t>29/11/2024</a:t>
+              <a:t>1/12/2024</a:t>
             </a:fld>
             <a:endParaRPr lang="en-AU"/>
           </a:p>
@@ -35083,7 +35071,7 @@
           <a:p>
             <a:fld id="{763871C2-E1E2-4868-9E66-FEFE29AC3DBE}" type="datetimeFigureOut">
               <a:rPr lang="en-AU" smtClean="0"/>
-              <a:t>29/11/2024</a:t>
+              <a:t>1/12/2024</a:t>
             </a:fld>
             <a:endParaRPr lang="en-AU"/>
           </a:p>
@@ -35396,7 +35384,7 @@
           <a:p>
             <a:fld id="{763871C2-E1E2-4868-9E66-FEFE29AC3DBE}" type="datetimeFigureOut">
               <a:rPr lang="en-AU" smtClean="0"/>
-              <a:t>29/11/2024</a:t>
+              <a:t>1/12/2024</a:t>
             </a:fld>
             <a:endParaRPr lang="en-AU"/>
           </a:p>
@@ -35685,7 +35673,7 @@
           <a:p>
             <a:fld id="{763871C2-E1E2-4868-9E66-FEFE29AC3DBE}" type="datetimeFigureOut">
               <a:rPr lang="en-AU" smtClean="0"/>
-              <a:t>29/11/2024</a:t>
+              <a:t>1/12/2024</a:t>
             </a:fld>
             <a:endParaRPr lang="en-AU"/>
           </a:p>
@@ -35928,7 +35916,7 @@
           <a:p>
             <a:fld id="{763871C2-E1E2-4868-9E66-FEFE29AC3DBE}" type="datetimeFigureOut">
               <a:rPr lang="en-AU" smtClean="0"/>
-              <a:t>29/11/2024</a:t>
+              <a:t>1/12/2024</a:t>
             </a:fld>
             <a:endParaRPr lang="en-AU"/>
           </a:p>
@@ -38366,7 +38354,7 @@
           <p:nvPr>
             <p:extLst>
               <p:ext uri="{D42A27DB-BD31-4B8C-83A1-F6EECF244321}">
-                <p14:modId xmlns:p14="http://schemas.microsoft.com/office/powerpoint/2010/main" val="57132037"/>
+                <p14:modId xmlns:p14="http://schemas.microsoft.com/office/powerpoint/2010/main" val="3449952528"/>
               </p:ext>
             </p:extLst>
           </p:nvPr>
@@ -38396,7 +38384,7 @@
           <p:nvPr>
             <p:extLst>
               <p:ext uri="{D42A27DB-BD31-4B8C-83A1-F6EECF244321}">
-                <p14:modId xmlns:p14="http://schemas.microsoft.com/office/powerpoint/2010/main" val="3094011220"/>
+                <p14:modId xmlns:p14="http://schemas.microsoft.com/office/powerpoint/2010/main" val="2412504356"/>
               </p:ext>
             </p:extLst>
           </p:nvPr>
@@ -38426,7 +38414,7 @@
           <p:nvPr>
             <p:extLst>
               <p:ext uri="{D42A27DB-BD31-4B8C-83A1-F6EECF244321}">
-                <p14:modId xmlns:p14="http://schemas.microsoft.com/office/powerpoint/2010/main" val="121495569"/>
+                <p14:modId xmlns:p14="http://schemas.microsoft.com/office/powerpoint/2010/main" val="4217504845"/>
               </p:ext>
             </p:extLst>
           </p:nvPr>
@@ -38476,7 +38464,7 @@
           <a:p>
             <a:r>
               <a:rPr lang="en-AU" dirty="0"/>
-              <a:t>API database of properties for pure compounds used to build new relationships. Total of 319 compounds used.</a:t>
+              <a:t>Database of properties for pure compounds used to build new relationships. Total of 319 compounds used.</a:t>
             </a:r>
           </a:p>
           <a:p>
@@ -38561,7 +38549,7 @@
           <a:p>
             <a:r>
               <a:rPr lang="en-AU" dirty="0"/>
-              <a:t>Single carbon number (SCN) used to designate a distillation cut is based on the number of carbon atoms for paraffins.</a:t>
+              <a:t>Single carbon number (SCN) used to designate a distillation cut is based on the number of carbon atoms for normal paraffins.</a:t>
             </a:r>
           </a:p>
           <a:p>
@@ -38586,7 +38574,15 @@
             </a:r>
             <a:r>
               <a:rPr lang="en-AU" dirty="0"/>
-              <a:t> and aromatics, we must determine the boiling point for the paraffin SCN, and from this obtain the estimated number of carbon atoms for NA fractions associated with an SCN.</a:t>
+              <a:t> and aromatics, we must determine the boiling point for the paraffins, and from this obtain the estimated number of carbon atoms for the associated </a:t>
+            </a:r>
+            <a:r>
+              <a:rPr lang="en-AU" dirty="0" err="1"/>
+              <a:t>napthenes</a:t>
+            </a:r>
+            <a:r>
+              <a:rPr lang="en-AU" dirty="0"/>
+              <a:t> and aromatics.</a:t>
             </a:r>
           </a:p>
         </p:txBody>
@@ -38912,7 +38908,7 @@
           <p:nvPr>
             <p:extLst>
               <p:ext uri="{D42A27DB-BD31-4B8C-83A1-F6EECF244321}">
-                <p14:modId xmlns:p14="http://schemas.microsoft.com/office/powerpoint/2010/main" val="2265657104"/>
+                <p14:modId xmlns:p14="http://schemas.microsoft.com/office/powerpoint/2010/main" val="254458659"/>
               </p:ext>
             </p:extLst>
           </p:nvPr>
@@ -38942,7 +38938,7 @@
           <p:nvPr>
             <p:extLst>
               <p:ext uri="{D42A27DB-BD31-4B8C-83A1-F6EECF244321}">
-                <p14:modId xmlns:p14="http://schemas.microsoft.com/office/powerpoint/2010/main" val="2243647856"/>
+                <p14:modId xmlns:p14="http://schemas.microsoft.com/office/powerpoint/2010/main" val="2422104330"/>
               </p:ext>
             </p:extLst>
           </p:nvPr>
@@ -38972,7 +38968,7 @@
           <p:nvPr>
             <p:extLst>
               <p:ext uri="{D42A27DB-BD31-4B8C-83A1-F6EECF244321}">
-                <p14:modId xmlns:p14="http://schemas.microsoft.com/office/powerpoint/2010/main" val="1273598202"/>
+                <p14:modId xmlns:p14="http://schemas.microsoft.com/office/powerpoint/2010/main" val="3020446852"/>
               </p:ext>
             </p:extLst>
           </p:nvPr>
@@ -42339,6 +42335,36 @@
       </p:grpSpPr>
       <p:graphicFrame>
         <p:nvGraphicFramePr>
+          <p:cNvPr id="6" name="Chart 5">
+            <a:extLst>
+              <a:ext uri="{FF2B5EF4-FFF2-40B4-BE49-F238E27FC236}">
+                <a16:creationId xmlns:a16="http://schemas.microsoft.com/office/drawing/2014/main" id="{EDC1D573-A29D-488E-BC66-9CE1ED6C82C0}"/>
+              </a:ext>
+            </a:extLst>
+          </p:cNvPr>
+          <p:cNvGraphicFramePr>
+            <a:graphicFrameLocks/>
+          </p:cNvGraphicFramePr>
+          <p:nvPr>
+            <p:extLst>
+              <p:ext uri="{D42A27DB-BD31-4B8C-83A1-F6EECF244321}">
+                <p14:modId xmlns:p14="http://schemas.microsoft.com/office/powerpoint/2010/main" val="1374076652"/>
+              </p:ext>
+            </p:extLst>
+          </p:nvPr>
+        </p:nvGraphicFramePr>
+        <p:xfrm>
+          <a:off x="731134" y="3500438"/>
+          <a:ext cx="4884516" cy="3357562"/>
+        </p:xfrm>
+        <a:graphic>
+          <a:graphicData uri="http://schemas.openxmlformats.org/drawingml/2006/chart">
+            <c:chart xmlns:c="http://schemas.openxmlformats.org/drawingml/2006/chart" xmlns:r="http://schemas.openxmlformats.org/officeDocument/2006/relationships" r:id="rId2"/>
+          </a:graphicData>
+        </a:graphic>
+      </p:graphicFrame>
+      <p:graphicFrame>
+        <p:nvGraphicFramePr>
           <p:cNvPr id="2" name="Chart 1">
             <a:extLst>
               <a:ext uri="{FF2B5EF4-FFF2-40B4-BE49-F238E27FC236}">
@@ -42363,36 +42389,6 @@
         </p:xfrm>
         <a:graphic>
           <a:graphicData uri="http://schemas.openxmlformats.org/drawingml/2006/chart">
-            <c:chart xmlns:c="http://schemas.openxmlformats.org/drawingml/2006/chart" xmlns:r="http://schemas.openxmlformats.org/officeDocument/2006/relationships" r:id="rId2"/>
-          </a:graphicData>
-        </a:graphic>
-      </p:graphicFrame>
-      <p:graphicFrame>
-        <p:nvGraphicFramePr>
-          <p:cNvPr id="3" name="Chart 2">
-            <a:extLst>
-              <a:ext uri="{FF2B5EF4-FFF2-40B4-BE49-F238E27FC236}">
-                <a16:creationId xmlns:a16="http://schemas.microsoft.com/office/drawing/2014/main" id="{EDC1D573-A29D-488E-BC66-9CE1ED6C82C0}"/>
-              </a:ext>
-            </a:extLst>
-          </p:cNvPr>
-          <p:cNvGraphicFramePr>
-            <a:graphicFrameLocks/>
-          </p:cNvGraphicFramePr>
-          <p:nvPr>
-            <p:extLst>
-              <p:ext uri="{D42A27DB-BD31-4B8C-83A1-F6EECF244321}">
-                <p14:modId xmlns:p14="http://schemas.microsoft.com/office/powerpoint/2010/main" val="1816822669"/>
-              </p:ext>
-            </p:extLst>
-          </p:nvPr>
-        </p:nvGraphicFramePr>
-        <p:xfrm>
-          <a:off x="731135" y="3500438"/>
-          <a:ext cx="4884516" cy="3357562"/>
-        </p:xfrm>
-        <a:graphic>
-          <a:graphicData uri="http://schemas.openxmlformats.org/drawingml/2006/chart">
             <c:chart xmlns:c="http://schemas.openxmlformats.org/drawingml/2006/chart" xmlns:r="http://schemas.openxmlformats.org/officeDocument/2006/relationships" r:id="rId3"/>
           </a:graphicData>
         </a:graphic>
@@ -42412,7 +42408,7 @@
         <p:spPr>
           <a:xfrm>
             <a:off x="5926237" y="4163556"/>
-            <a:ext cx="5569858" cy="2031325"/>
+            <a:ext cx="5569858" cy="1754326"/>
           </a:xfrm>
           <a:prstGeom prst="rect">
             <a:avLst/>
@@ -42449,7 +42445,7 @@
           <a:p>
             <a:r>
               <a:rPr lang="en-AU" dirty="0"/>
-              <a:t>Method exhibits good match between predicted aromatics and measured aromatics for the Volve dataset.</a:t>
+              <a:t>Method exhibits good match between predicted and measured aromatics for the Volve dataset.</a:t>
             </a:r>
           </a:p>
         </p:txBody>

</xml_diff>